<commit_message>
Implemented Export graph to PPTX
</commit_message>
<xml_diff>
--- a/Template_Report.pptx
+++ b/Template_Report.pptx
@@ -273,7 +273,7 @@
           <a:p>
             <a:fld id="{0636C835-E120-4134-B60F-ABD596A38320}" type="datetimeFigureOut">
               <a:rPr lang="ko-KR" altLang="en-US" smtClean="0"/>
-              <a:t>2024-02-23</a:t>
+              <a:t>2024-02-28</a:t>
             </a:fld>
             <a:endParaRPr lang="ko-KR" altLang="en-US"/>
           </a:p>
@@ -438,7 +438,7 @@
           <a:p>
             <a:fld id="{FA8743F4-7298-4609-A154-E3A1492A11EA}" type="datetimeFigureOut">
               <a:rPr lang="ko-KR" altLang="en-US" smtClean="0"/>
-              <a:t>2024-02-23</a:t>
+              <a:t>2024-02-28</a:t>
             </a:fld>
             <a:endParaRPr lang="ko-KR" altLang="en-US"/>
           </a:p>
@@ -4311,765 +4311,6 @@
           </a:p>
         </p:txBody>
       </p:sp>
-      <p:graphicFrame>
-        <p:nvGraphicFramePr>
-          <p:cNvPr id="9" name="Table 8"/>
-          <p:cNvGraphicFramePr>
-            <a:graphicFrameLocks noGrp="1"/>
-          </p:cNvGraphicFramePr>
-          <p:nvPr>
-            <p:extLst/>
-          </p:nvPr>
-        </p:nvGraphicFramePr>
-        <p:xfrm>
-          <a:off x="6897217" y="692696"/>
-          <a:ext cx="2952328" cy="485775"/>
-        </p:xfrm>
-        <a:graphic>
-          <a:graphicData uri="http://schemas.openxmlformats.org/drawingml/2006/table">
-            <a:tbl>
-              <a:tblPr/>
-              <a:tblGrid>
-                <a:gridCol w="1022854">
-                  <a:extLst>
-                    <a:ext uri="{9D8B030D-6E8A-4147-A177-3AD203B41FA5}">
-                      <a16:colId xmlns:a16="http://schemas.microsoft.com/office/drawing/2014/main" val="4253317246"/>
-                    </a:ext>
-                  </a:extLst>
-                </a:gridCol>
-                <a:gridCol w="1615643">
-                  <a:extLst>
-                    <a:ext uri="{9D8B030D-6E8A-4147-A177-3AD203B41FA5}">
-                      <a16:colId xmlns:a16="http://schemas.microsoft.com/office/drawing/2014/main" val="1977838172"/>
-                    </a:ext>
-                  </a:extLst>
-                </a:gridCol>
-                <a:gridCol w="313831">
-                  <a:extLst>
-                    <a:ext uri="{9D8B030D-6E8A-4147-A177-3AD203B41FA5}">
-                      <a16:colId xmlns:a16="http://schemas.microsoft.com/office/drawing/2014/main" val="3225832083"/>
-                    </a:ext>
-                  </a:extLst>
-                </a:gridCol>
-              </a:tblGrid>
-              <a:tr h="161925">
-                <a:tc>
-                  <a:txBody>
-                    <a:bodyPr/>
-                    <a:lstStyle/>
-                    <a:p>
-                      <a:pPr algn="ctr" rtl="0" fontAlgn="ctr"/>
-                      <a:r>
-                        <a:rPr lang="en-US" sz="700" b="1" i="0" u="none" strike="noStrike">
-                          <a:solidFill>
-                            <a:srgbClr val="000000"/>
-                          </a:solidFill>
-                          <a:effectLst/>
-                          <a:latin typeface="LG Smart_H Regular" panose="020B0600000101010101" pitchFamily="34" charset="-127"/>
-                          <a:ea typeface="LG Smart_H Regular" panose="020B0600000101010101" pitchFamily="34" charset="-127"/>
-                        </a:rPr>
-                        <a:t>Object</a:t>
-                      </a:r>
-                    </a:p>
-                  </a:txBody>
-                  <a:tcPr marL="9525" marR="9525" marT="9525" marB="0" anchor="ctr">
-                    <a:lnL w="6350" cap="flat" cmpd="sng" algn="ctr">
-                      <a:solidFill>
-                        <a:srgbClr val="D9D9D9"/>
-                      </a:solidFill>
-                      <a:prstDash val="solid"/>
-                      <a:round/>
-                      <a:headEnd type="none" w="med" len="med"/>
-                      <a:tailEnd type="none" w="med" len="med"/>
-                    </a:lnL>
-                    <a:lnR w="6350" cap="flat" cmpd="sng" algn="ctr">
-                      <a:solidFill>
-                        <a:srgbClr val="D9D9D9"/>
-                      </a:solidFill>
-                      <a:prstDash val="solid"/>
-                      <a:round/>
-                      <a:headEnd type="none" w="med" len="med"/>
-                      <a:tailEnd type="none" w="med" len="med"/>
-                    </a:lnR>
-                    <a:lnT w="6350" cap="flat" cmpd="sng" algn="ctr">
-                      <a:solidFill>
-                        <a:srgbClr val="D9D9D9"/>
-                      </a:solidFill>
-                      <a:prstDash val="solid"/>
-                      <a:round/>
-                      <a:headEnd type="none" w="med" len="med"/>
-                      <a:tailEnd type="none" w="med" len="med"/>
-                    </a:lnT>
-                    <a:lnB w="6350" cap="flat" cmpd="sng" algn="ctr">
-                      <a:solidFill>
-                        <a:srgbClr val="D9D9D9"/>
-                      </a:solidFill>
-                      <a:prstDash val="solid"/>
-                      <a:round/>
-                      <a:headEnd type="none" w="med" len="med"/>
-                      <a:tailEnd type="none" w="med" len="med"/>
-                    </a:lnB>
-                    <a:solidFill>
-                      <a:srgbClr val="F2F2F2"/>
-                    </a:solidFill>
-                  </a:tcPr>
-                </a:tc>
-                <a:tc>
-                  <a:txBody>
-                    <a:bodyPr/>
-                    <a:lstStyle/>
-                    <a:p>
-                      <a:pPr algn="ctr" rtl="0" fontAlgn="ctr"/>
-                      <a:r>
-                        <a:rPr lang="vi-VN" sz="700" b="1" i="0" u="none" strike="noStrike" smtClean="0">
-                          <a:solidFill>
-                            <a:srgbClr val="000000"/>
-                          </a:solidFill>
-                          <a:effectLst/>
-                          <a:latin typeface="LG Smart_H Regular" panose="020B0600000101010101" pitchFamily="34" charset="-127"/>
-                          <a:ea typeface="LG Smart_H Regular" panose="020B0600000101010101" pitchFamily="34" charset="-127"/>
-                        </a:rPr>
-                        <a:t>PUC</a:t>
-                      </a:r>
-                      <a:r>
-                        <a:rPr lang="vi-VN" sz="700" b="1" i="0" u="none" strike="noStrike" baseline="0" smtClean="0">
-                          <a:solidFill>
-                            <a:srgbClr val="000000"/>
-                          </a:solidFill>
-                          <a:effectLst/>
-                          <a:latin typeface="LG Smart_H Regular" panose="020B0600000101010101" pitchFamily="34" charset="-127"/>
-                          <a:ea typeface="LG Smart_H Regular" panose="020B0600000101010101" pitchFamily="34" charset="-127"/>
-                        </a:rPr>
-                        <a:t> </a:t>
-                      </a:r>
-                      <a:r>
-                        <a:rPr lang="en-US" sz="700" b="1" i="0" u="none" strike="noStrike" baseline="0" smtClean="0">
-                          <a:solidFill>
-                            <a:srgbClr val="000000"/>
-                          </a:solidFill>
-                          <a:effectLst/>
-                          <a:latin typeface="LG Smart_H Regular" panose="020B0600000101010101" pitchFamily="34" charset="-127"/>
-                          <a:ea typeface="LG Smart_H Regular" panose="020B0600000101010101" pitchFamily="34" charset="-127"/>
-                        </a:rPr>
-                        <a:t>Machine</a:t>
-                      </a:r>
-                      <a:endParaRPr lang="en-US" sz="700" b="1" i="0" u="none" strike="noStrike" dirty="0">
-                        <a:solidFill>
-                          <a:srgbClr val="000000"/>
-                        </a:solidFill>
-                        <a:effectLst/>
-                        <a:latin typeface="LG Smart_H Regular" panose="020B0600000101010101" pitchFamily="34" charset="-127"/>
-                        <a:ea typeface="LG Smart_H Regular" panose="020B0600000101010101" pitchFamily="34" charset="-127"/>
-                      </a:endParaRPr>
-                    </a:p>
-                  </a:txBody>
-                  <a:tcPr marL="9525" marR="9525" marT="9525" marB="0" anchor="ctr">
-                    <a:lnL w="6350" cap="flat" cmpd="sng" algn="ctr">
-                      <a:solidFill>
-                        <a:srgbClr val="D9D9D9"/>
-                      </a:solidFill>
-                      <a:prstDash val="solid"/>
-                      <a:round/>
-                      <a:headEnd type="none" w="med" len="med"/>
-                      <a:tailEnd type="none" w="med" len="med"/>
-                    </a:lnL>
-                    <a:lnR w="6350" cap="flat" cmpd="sng" algn="ctr">
-                      <a:solidFill>
-                        <a:srgbClr val="D9D9D9"/>
-                      </a:solidFill>
-                      <a:prstDash val="solid"/>
-                      <a:round/>
-                      <a:headEnd type="none" w="med" len="med"/>
-                      <a:tailEnd type="none" w="med" len="med"/>
-                    </a:lnR>
-                    <a:lnT w="6350" cap="flat" cmpd="sng" algn="ctr">
-                      <a:solidFill>
-                        <a:srgbClr val="D9D9D9"/>
-                      </a:solidFill>
-                      <a:prstDash val="solid"/>
-                      <a:round/>
-                      <a:headEnd type="none" w="med" len="med"/>
-                      <a:tailEnd type="none" w="med" len="med"/>
-                    </a:lnT>
-                    <a:lnB w="6350" cap="flat" cmpd="sng" algn="ctr">
-                      <a:solidFill>
-                        <a:srgbClr val="D9D9D9"/>
-                      </a:solidFill>
-                      <a:prstDash val="solid"/>
-                      <a:round/>
-                      <a:headEnd type="none" w="med" len="med"/>
-                      <a:tailEnd type="none" w="med" len="med"/>
-                    </a:lnB>
-                    <a:solidFill>
-                      <a:srgbClr val="F2F2F2"/>
-                    </a:solidFill>
-                  </a:tcPr>
-                </a:tc>
-                <a:tc>
-                  <a:txBody>
-                    <a:bodyPr/>
-                    <a:lstStyle/>
-                    <a:p>
-                      <a:pPr algn="ctr" rtl="0" fontAlgn="ctr"/>
-                      <a:r>
-                        <a:rPr lang="en-US" sz="700" b="1" i="0" u="none" strike="noStrike">
-                          <a:solidFill>
-                            <a:srgbClr val="000000"/>
-                          </a:solidFill>
-                          <a:effectLst/>
-                          <a:latin typeface="LG Smart_H Regular" panose="020B0600000101010101" pitchFamily="34" charset="-127"/>
-                          <a:ea typeface="LG Smart_H Regular" panose="020B0600000101010101" pitchFamily="34" charset="-127"/>
-                        </a:rPr>
-                        <a:t>N</a:t>
-                      </a:r>
-                    </a:p>
-                  </a:txBody>
-                  <a:tcPr marL="9525" marR="9525" marT="9525" marB="0" anchor="ctr">
-                    <a:lnL w="6350" cap="flat" cmpd="sng" algn="ctr">
-                      <a:solidFill>
-                        <a:srgbClr val="D9D9D9"/>
-                      </a:solidFill>
-                      <a:prstDash val="solid"/>
-                      <a:round/>
-                      <a:headEnd type="none" w="med" len="med"/>
-                      <a:tailEnd type="none" w="med" len="med"/>
-                    </a:lnL>
-                    <a:lnR w="6350" cap="flat" cmpd="sng" algn="ctr">
-                      <a:solidFill>
-                        <a:srgbClr val="D9D9D9"/>
-                      </a:solidFill>
-                      <a:prstDash val="solid"/>
-                      <a:round/>
-                      <a:headEnd type="none" w="med" len="med"/>
-                      <a:tailEnd type="none" w="med" len="med"/>
-                    </a:lnR>
-                    <a:lnT w="6350" cap="flat" cmpd="sng" algn="ctr">
-                      <a:solidFill>
-                        <a:srgbClr val="D9D9D9"/>
-                      </a:solidFill>
-                      <a:prstDash val="solid"/>
-                      <a:round/>
-                      <a:headEnd type="none" w="med" len="med"/>
-                      <a:tailEnd type="none" w="med" len="med"/>
-                    </a:lnT>
-                    <a:lnB w="6350" cap="flat" cmpd="sng" algn="ctr">
-                      <a:solidFill>
-                        <a:srgbClr val="D9D9D9"/>
-                      </a:solidFill>
-                      <a:prstDash val="solid"/>
-                      <a:round/>
-                      <a:headEnd type="none" w="med" len="med"/>
-                      <a:tailEnd type="none" w="med" len="med"/>
-                    </a:lnB>
-                    <a:solidFill>
-                      <a:srgbClr val="F2F2F2"/>
-                    </a:solidFill>
-                  </a:tcPr>
-                </a:tc>
-                <a:extLst>
-                  <a:ext uri="{0D108BD9-81ED-4DB2-BD59-A6C34878D82A}">
-                    <a16:rowId xmlns:a16="http://schemas.microsoft.com/office/drawing/2014/main" val="2898628585"/>
-                  </a:ext>
-                </a:extLst>
-              </a:tr>
-              <a:tr h="161925">
-                <a:tc>
-                  <a:txBody>
-                    <a:bodyPr/>
-                    <a:lstStyle/>
-                    <a:p>
-                      <a:pPr algn="ctr" rtl="0" fontAlgn="b"/>
-                      <a:r>
-                        <a:rPr lang="vi-VN" sz="700" b="0" i="0" u="none" strike="noStrike" smtClean="0">
-                          <a:solidFill>
-                            <a:srgbClr val="000000"/>
-                          </a:solidFill>
-                          <a:effectLst/>
-                          <a:latin typeface="LG Smart_H Regular" panose="020B0600000101010101" pitchFamily="34" charset="-127"/>
-                          <a:ea typeface="LG Smart_H Regular" panose="020B0600000101010101" pitchFamily="34" charset="-127"/>
-                        </a:rPr>
-                        <a:t>Mono</a:t>
-                      </a:r>
-                      <a:endParaRPr lang="en-US" sz="700" b="0" i="0" u="none" strike="noStrike" dirty="0">
-                        <a:solidFill>
-                          <a:srgbClr val="000000"/>
-                        </a:solidFill>
-                        <a:effectLst/>
-                        <a:latin typeface="LG Smart_H Regular" panose="020B0600000101010101" pitchFamily="34" charset="-127"/>
-                        <a:ea typeface="LG Smart_H Regular" panose="020B0600000101010101" pitchFamily="34" charset="-127"/>
-                      </a:endParaRPr>
-                    </a:p>
-                  </a:txBody>
-                  <a:tcPr marL="9525" marR="9525" marT="9525" marB="0" anchor="b">
-                    <a:lnL w="6350" cap="flat" cmpd="sng" algn="ctr">
-                      <a:solidFill>
-                        <a:srgbClr val="D9D9D9"/>
-                      </a:solidFill>
-                      <a:prstDash val="solid"/>
-                      <a:round/>
-                      <a:headEnd type="none" w="med" len="med"/>
-                      <a:tailEnd type="none" w="med" len="med"/>
-                    </a:lnL>
-                    <a:lnR w="6350" cap="flat" cmpd="sng" algn="ctr">
-                      <a:solidFill>
-                        <a:srgbClr val="D9D9D9"/>
-                      </a:solidFill>
-                      <a:prstDash val="solid"/>
-                      <a:round/>
-                      <a:headEnd type="none" w="med" len="med"/>
-                      <a:tailEnd type="none" w="med" len="med"/>
-                    </a:lnR>
-                    <a:lnT w="6350" cap="flat" cmpd="sng" algn="ctr">
-                      <a:solidFill>
-                        <a:srgbClr val="D9D9D9"/>
-                      </a:solidFill>
-                      <a:prstDash val="solid"/>
-                      <a:round/>
-                      <a:headEnd type="none" w="med" len="med"/>
-                      <a:tailEnd type="none" w="med" len="med"/>
-                    </a:lnT>
-                    <a:lnB w="6350" cap="flat" cmpd="sng" algn="ctr">
-                      <a:solidFill>
-                        <a:srgbClr val="D9D9D9"/>
-                      </a:solidFill>
-                      <a:prstDash val="solid"/>
-                      <a:round/>
-                      <a:headEnd type="none" w="med" len="med"/>
-                      <a:tailEnd type="none" w="med" len="med"/>
-                    </a:lnB>
-                  </a:tcPr>
-                </a:tc>
-                <a:tc>
-                  <a:txBody>
-                    <a:bodyPr/>
-                    <a:lstStyle/>
-                    <a:p>
-                      <a:pPr algn="ctr" rtl="0" fontAlgn="b"/>
-                      <a:r>
-                        <a:rPr lang="vi-VN" sz="700" b="0" i="0" u="none" strike="noStrike" smtClean="0">
-                          <a:solidFill>
-                            <a:srgbClr val="000000"/>
-                          </a:solidFill>
-                          <a:effectLst/>
-                          <a:latin typeface="LG Smart_H Regular" panose="020B0600000101010101" pitchFamily="34" charset="-127"/>
-                          <a:ea typeface="LG Smart_H Regular" panose="020B0600000101010101" pitchFamily="34" charset="-127"/>
-                        </a:rPr>
-                        <a:t>300nits</a:t>
-                      </a:r>
-                      <a:r>
-                        <a:rPr lang="vi-VN" sz="700" b="0" i="0" u="none" strike="noStrike" baseline="0" smtClean="0">
-                          <a:solidFill>
-                            <a:srgbClr val="000000"/>
-                          </a:solidFill>
-                          <a:effectLst/>
-                          <a:latin typeface="LG Smart_H Regular" panose="020B0600000101010101" pitchFamily="34" charset="-127"/>
-                          <a:ea typeface="LG Smart_H Regular" panose="020B0600000101010101" pitchFamily="34" charset="-127"/>
-                        </a:rPr>
-                        <a:t> capture + DLL 4.0.5.15</a:t>
-                      </a:r>
-                      <a:endParaRPr lang="en-US" sz="700" b="0" i="0" u="none" strike="noStrike" dirty="0">
-                        <a:solidFill>
-                          <a:srgbClr val="000000"/>
-                        </a:solidFill>
-                        <a:effectLst/>
-                        <a:latin typeface="LG Smart_H Regular" panose="020B0600000101010101" pitchFamily="34" charset="-127"/>
-                        <a:ea typeface="LG Smart_H Regular" panose="020B0600000101010101" pitchFamily="34" charset="-127"/>
-                      </a:endParaRPr>
-                    </a:p>
-                  </a:txBody>
-                  <a:tcPr marL="9525" marR="9525" marT="9525" marB="0" anchor="b">
-                    <a:lnL w="6350" cap="flat" cmpd="sng" algn="ctr">
-                      <a:solidFill>
-                        <a:srgbClr val="D9D9D9"/>
-                      </a:solidFill>
-                      <a:prstDash val="solid"/>
-                      <a:round/>
-                      <a:headEnd type="none" w="med" len="med"/>
-                      <a:tailEnd type="none" w="med" len="med"/>
-                    </a:lnL>
-                    <a:lnR w="6350" cap="flat" cmpd="sng" algn="ctr">
-                      <a:solidFill>
-                        <a:srgbClr val="D9D9D9"/>
-                      </a:solidFill>
-                      <a:prstDash val="solid"/>
-                      <a:round/>
-                      <a:headEnd type="none" w="med" len="med"/>
-                      <a:tailEnd type="none" w="med" len="med"/>
-                    </a:lnR>
-                    <a:lnT w="6350" cap="flat" cmpd="sng" algn="ctr">
-                      <a:solidFill>
-                        <a:srgbClr val="D9D9D9"/>
-                      </a:solidFill>
-                      <a:prstDash val="solid"/>
-                      <a:round/>
-                      <a:headEnd type="none" w="med" len="med"/>
-                      <a:tailEnd type="none" w="med" len="med"/>
-                    </a:lnT>
-                    <a:lnB w="6350" cap="flat" cmpd="sng" algn="ctr">
-                      <a:solidFill>
-                        <a:srgbClr val="D9D9D9"/>
-                      </a:solidFill>
-                      <a:prstDash val="solid"/>
-                      <a:round/>
-                      <a:headEnd type="none" w="med" len="med"/>
-                      <a:tailEnd type="none" w="med" len="med"/>
-                    </a:lnB>
-                  </a:tcPr>
-                </a:tc>
-                <a:tc>
-                  <a:txBody>
-                    <a:bodyPr/>
-                    <a:lstStyle/>
-                    <a:p>
-                      <a:pPr algn="ctr" rtl="0" fontAlgn="b"/>
-                      <a:r>
-                        <a:rPr lang="en-US" sz="700" b="0" i="0" u="none" strike="noStrike" smtClean="0">
-                          <a:solidFill>
-                            <a:srgbClr val="000000"/>
-                          </a:solidFill>
-                          <a:effectLst/>
-                          <a:latin typeface="LG Smart_H Regular" panose="020B0600000101010101" pitchFamily="34" charset="-127"/>
-                          <a:ea typeface="LG Smart_H Regular" panose="020B0600000101010101" pitchFamily="34" charset="-127"/>
-                        </a:rPr>
-                        <a:t>236</a:t>
-                      </a:r>
-                      <a:endParaRPr lang="en-US" sz="700" b="0" i="0" u="none" strike="noStrike" dirty="0">
-                        <a:solidFill>
-                          <a:srgbClr val="000000"/>
-                        </a:solidFill>
-                        <a:effectLst/>
-                        <a:latin typeface="LG Smart_H Regular" panose="020B0600000101010101" pitchFamily="34" charset="-127"/>
-                        <a:ea typeface="LG Smart_H Regular" panose="020B0600000101010101" pitchFamily="34" charset="-127"/>
-                      </a:endParaRPr>
-                    </a:p>
-                  </a:txBody>
-                  <a:tcPr marL="9525" marR="9525" marT="9525" marB="0" anchor="b">
-                    <a:lnL w="6350" cap="flat" cmpd="sng" algn="ctr">
-                      <a:solidFill>
-                        <a:srgbClr val="D9D9D9"/>
-                      </a:solidFill>
-                      <a:prstDash val="solid"/>
-                      <a:round/>
-                      <a:headEnd type="none" w="med" len="med"/>
-                      <a:tailEnd type="none" w="med" len="med"/>
-                    </a:lnL>
-                    <a:lnR w="6350" cap="flat" cmpd="sng" algn="ctr">
-                      <a:solidFill>
-                        <a:srgbClr val="D9D9D9"/>
-                      </a:solidFill>
-                      <a:prstDash val="solid"/>
-                      <a:round/>
-                      <a:headEnd type="none" w="med" len="med"/>
-                      <a:tailEnd type="none" w="med" len="med"/>
-                    </a:lnR>
-                    <a:lnT w="6350" cap="flat" cmpd="sng" algn="ctr">
-                      <a:solidFill>
-                        <a:srgbClr val="D9D9D9"/>
-                      </a:solidFill>
-                      <a:prstDash val="solid"/>
-                      <a:round/>
-                      <a:headEnd type="none" w="med" len="med"/>
-                      <a:tailEnd type="none" w="med" len="med"/>
-                    </a:lnT>
-                    <a:lnB w="6350" cap="flat" cmpd="sng" algn="ctr">
-                      <a:solidFill>
-                        <a:srgbClr val="D9D9D9"/>
-                      </a:solidFill>
-                      <a:prstDash val="solid"/>
-                      <a:round/>
-                      <a:headEnd type="none" w="med" len="med"/>
-                      <a:tailEnd type="none" w="med" len="med"/>
-                    </a:lnB>
-                  </a:tcPr>
-                </a:tc>
-                <a:extLst>
-                  <a:ext uri="{0D108BD9-81ED-4DB2-BD59-A6C34878D82A}">
-                    <a16:rowId xmlns:a16="http://schemas.microsoft.com/office/drawing/2014/main" val="1204678615"/>
-                  </a:ext>
-                </a:extLst>
-              </a:tr>
-              <a:tr h="161925">
-                <a:tc>
-                  <a:txBody>
-                    <a:bodyPr/>
-                    <a:lstStyle/>
-                    <a:p>
-                      <a:pPr algn="ctr" rtl="0" fontAlgn="b"/>
-                      <a:r>
-                        <a:rPr lang="en-US" sz="700" b="0" i="0" u="none" strike="noStrike" smtClean="0">
-                          <a:solidFill>
-                            <a:srgbClr val="000000"/>
-                          </a:solidFill>
-                          <a:effectLst/>
-                          <a:latin typeface="LG Smart_H Regular" panose="020B0600000101010101" pitchFamily="34" charset="-127"/>
-                          <a:ea typeface="LG Smart_H Regular" panose="020B0600000101010101" pitchFamily="34" charset="-127"/>
-                        </a:rPr>
-                        <a:t>Color</a:t>
-                      </a:r>
-                      <a:endParaRPr lang="en-US" sz="700" b="0" i="0" u="none" strike="noStrike" dirty="0">
-                        <a:solidFill>
-                          <a:srgbClr val="000000"/>
-                        </a:solidFill>
-                        <a:effectLst/>
-                        <a:latin typeface="LG Smart_H Regular" panose="020B0600000101010101" pitchFamily="34" charset="-127"/>
-                        <a:ea typeface="LG Smart_H Regular" panose="020B0600000101010101" pitchFamily="34" charset="-127"/>
-                      </a:endParaRPr>
-                    </a:p>
-                  </a:txBody>
-                  <a:tcPr marL="9525" marR="9525" marT="9525" marB="0" anchor="b">
-                    <a:lnL w="6350" cap="flat" cmpd="sng" algn="ctr">
-                      <a:solidFill>
-                        <a:srgbClr val="D9D9D9"/>
-                      </a:solidFill>
-                      <a:prstDash val="solid"/>
-                      <a:round/>
-                      <a:headEnd type="none" w="med" len="med"/>
-                      <a:tailEnd type="none" w="med" len="med"/>
-                    </a:lnL>
-                    <a:lnR w="6350" cap="flat" cmpd="sng" algn="ctr">
-                      <a:solidFill>
-                        <a:srgbClr val="D9D9D9"/>
-                      </a:solidFill>
-                      <a:prstDash val="solid"/>
-                      <a:round/>
-                      <a:headEnd type="none" w="med" len="med"/>
-                      <a:tailEnd type="none" w="med" len="med"/>
-                    </a:lnR>
-                    <a:lnT w="6350" cap="flat" cmpd="sng" algn="ctr">
-                      <a:solidFill>
-                        <a:srgbClr val="D9D9D9"/>
-                      </a:solidFill>
-                      <a:prstDash val="solid"/>
-                      <a:round/>
-                      <a:headEnd type="none" w="med" len="med"/>
-                      <a:tailEnd type="none" w="med" len="med"/>
-                    </a:lnT>
-                    <a:lnB w="6350" cap="flat" cmpd="sng" algn="ctr">
-                      <a:solidFill>
-                        <a:srgbClr val="D9D9D9"/>
-                      </a:solidFill>
-                      <a:prstDash val="solid"/>
-                      <a:round/>
-                      <a:headEnd type="none" w="med" len="med"/>
-                      <a:tailEnd type="none" w="med" len="med"/>
-                    </a:lnB>
-                  </a:tcPr>
-                </a:tc>
-                <a:tc>
-                  <a:txBody>
-                    <a:bodyPr/>
-                    <a:lstStyle/>
-                    <a:p>
-                      <a:pPr algn="ctr" rtl="0" fontAlgn="b"/>
-                      <a:r>
-                        <a:rPr lang="vi-VN" sz="700" b="0" i="0" u="none" strike="noStrike" smtClean="0">
-                          <a:solidFill>
-                            <a:srgbClr val="000000"/>
-                          </a:solidFill>
-                          <a:effectLst/>
-                          <a:latin typeface="LG Smart_H Regular" panose="020B0600000101010101" pitchFamily="34" charset="-127"/>
-                          <a:ea typeface="LG Smart_H Regular" panose="020B0600000101010101" pitchFamily="34" charset="-127"/>
-                        </a:rPr>
-                        <a:t>Mono + Color Cam at RGB 31/43</a:t>
-                      </a:r>
-                      <a:endParaRPr lang="en-US" sz="700" b="0" i="0" u="none" strike="noStrike" dirty="0">
-                        <a:solidFill>
-                          <a:srgbClr val="000000"/>
-                        </a:solidFill>
-                        <a:effectLst/>
-                        <a:latin typeface="LG Smart_H Regular" panose="020B0600000101010101" pitchFamily="34" charset="-127"/>
-                        <a:ea typeface="LG Smart_H Regular" panose="020B0600000101010101" pitchFamily="34" charset="-127"/>
-                      </a:endParaRPr>
-                    </a:p>
-                  </a:txBody>
-                  <a:tcPr marL="9525" marR="9525" marT="9525" marB="0" anchor="b">
-                    <a:lnL w="6350" cap="flat" cmpd="sng" algn="ctr">
-                      <a:solidFill>
-                        <a:srgbClr val="D9D9D9"/>
-                      </a:solidFill>
-                      <a:prstDash val="solid"/>
-                      <a:round/>
-                      <a:headEnd type="none" w="med" len="med"/>
-                      <a:tailEnd type="none" w="med" len="med"/>
-                    </a:lnL>
-                    <a:lnR w="6350" cap="flat" cmpd="sng" algn="ctr">
-                      <a:solidFill>
-                        <a:srgbClr val="D9D9D9"/>
-                      </a:solidFill>
-                      <a:prstDash val="solid"/>
-                      <a:round/>
-                      <a:headEnd type="none" w="med" len="med"/>
-                      <a:tailEnd type="none" w="med" len="med"/>
-                    </a:lnR>
-                    <a:lnT w="6350" cap="flat" cmpd="sng" algn="ctr">
-                      <a:solidFill>
-                        <a:srgbClr val="D9D9D9"/>
-                      </a:solidFill>
-                      <a:prstDash val="solid"/>
-                      <a:round/>
-                      <a:headEnd type="none" w="med" len="med"/>
-                      <a:tailEnd type="none" w="med" len="med"/>
-                    </a:lnT>
-                    <a:lnB w="6350" cap="flat" cmpd="sng" algn="ctr">
-                      <a:solidFill>
-                        <a:srgbClr val="D9D9D9"/>
-                      </a:solidFill>
-                      <a:prstDash val="solid"/>
-                      <a:round/>
-                      <a:headEnd type="none" w="med" len="med"/>
-                      <a:tailEnd type="none" w="med" len="med"/>
-                    </a:lnB>
-                  </a:tcPr>
-                </a:tc>
-                <a:tc>
-                  <a:txBody>
-                    <a:bodyPr/>
-                    <a:lstStyle/>
-                    <a:p>
-                      <a:pPr algn="ctr" rtl="0" fontAlgn="b"/>
-                      <a:r>
-                        <a:rPr lang="en-US" sz="700" b="0" i="0" u="none" strike="noStrike" smtClean="0">
-                          <a:solidFill>
-                            <a:srgbClr val="000000"/>
-                          </a:solidFill>
-                          <a:effectLst/>
-                          <a:latin typeface="LG Smart_H Regular" panose="020B0600000101010101" pitchFamily="34" charset="-127"/>
-                          <a:ea typeface="LG Smart_H Regular" panose="020B0600000101010101" pitchFamily="34" charset="-127"/>
-                        </a:rPr>
-                        <a:t>236</a:t>
-                      </a:r>
-                      <a:endParaRPr lang="en-US" sz="700" b="0" i="0" u="none" strike="noStrike" dirty="0">
-                        <a:solidFill>
-                          <a:srgbClr val="000000"/>
-                        </a:solidFill>
-                        <a:effectLst/>
-                        <a:latin typeface="LG Smart_H Regular" panose="020B0600000101010101" pitchFamily="34" charset="-127"/>
-                        <a:ea typeface="LG Smart_H Regular" panose="020B0600000101010101" pitchFamily="34" charset="-127"/>
-                      </a:endParaRPr>
-                    </a:p>
-                  </a:txBody>
-                  <a:tcPr marL="9525" marR="9525" marT="9525" marB="0" anchor="b">
-                    <a:lnL w="6350" cap="flat" cmpd="sng" algn="ctr">
-                      <a:solidFill>
-                        <a:srgbClr val="D9D9D9"/>
-                      </a:solidFill>
-                      <a:prstDash val="solid"/>
-                      <a:round/>
-                      <a:headEnd type="none" w="med" len="med"/>
-                      <a:tailEnd type="none" w="med" len="med"/>
-                    </a:lnL>
-                    <a:lnR w="6350" cap="flat" cmpd="sng" algn="ctr">
-                      <a:solidFill>
-                        <a:srgbClr val="D9D9D9"/>
-                      </a:solidFill>
-                      <a:prstDash val="solid"/>
-                      <a:round/>
-                      <a:headEnd type="none" w="med" len="med"/>
-                      <a:tailEnd type="none" w="med" len="med"/>
-                    </a:lnR>
-                    <a:lnT w="6350" cap="flat" cmpd="sng" algn="ctr">
-                      <a:solidFill>
-                        <a:srgbClr val="D9D9D9"/>
-                      </a:solidFill>
-                      <a:prstDash val="solid"/>
-                      <a:round/>
-                      <a:headEnd type="none" w="med" len="med"/>
-                      <a:tailEnd type="none" w="med" len="med"/>
-                    </a:lnT>
-                    <a:lnB w="6350" cap="flat" cmpd="sng" algn="ctr">
-                      <a:solidFill>
-                        <a:srgbClr val="D9D9D9"/>
-                      </a:solidFill>
-                      <a:prstDash val="solid"/>
-                      <a:round/>
-                      <a:headEnd type="none" w="med" len="med"/>
-                      <a:tailEnd type="none" w="med" len="med"/>
-                    </a:lnB>
-                  </a:tcPr>
-                </a:tc>
-                <a:extLst>
-                  <a:ext uri="{0D108BD9-81ED-4DB2-BD59-A6C34878D82A}">
-                    <a16:rowId xmlns:a16="http://schemas.microsoft.com/office/drawing/2014/main" val="3642427511"/>
-                  </a:ext>
-                </a:extLst>
-              </a:tr>
-            </a:tbl>
-          </a:graphicData>
-        </a:graphic>
-      </p:graphicFrame>
-      <p:sp>
-        <p:nvSpPr>
-          <p:cNvPr id="11" name="TextBox 10"/>
-          <p:cNvSpPr txBox="1"/>
-          <p:nvPr/>
-        </p:nvSpPr>
-        <p:spPr>
-          <a:xfrm>
-            <a:off x="62006" y="700512"/>
-            <a:ext cx="6192688" cy="261610"/>
-          </a:xfrm>
-          <a:prstGeom prst="rect">
-            <a:avLst/>
-          </a:prstGeom>
-          <a:noFill/>
-        </p:spPr>
-        <p:txBody>
-          <a:bodyPr wrap="square" rtlCol="0">
-            <a:spAutoFit/>
-          </a:bodyPr>
-          <a:lstStyle/>
-          <a:p>
-            <a:pPr marL="171450" marR="0" lvl="0" indent="-171450" algn="l" defTabSz="914400" rtl="0" eaLnBrk="1" fontAlgn="auto" latinLnBrk="1" hangingPunct="1">
-              <a:lnSpc>
-                <a:spcPct val="100000"/>
-              </a:lnSpc>
-              <a:spcBef>
-                <a:spcPts val="0"/>
-              </a:spcBef>
-              <a:spcAft>
-                <a:spcPts val="0"/>
-              </a:spcAft>
-              <a:buClrTx/>
-              <a:buSzTx/>
-              <a:buFont typeface="Arial" panose="020B0604020202020204" pitchFamily="34" charset="0"/>
-              <a:buChar char="•"/>
-              <a:tabLst/>
-              <a:defRPr/>
-            </a:pPr>
-            <a:r>
-              <a:rPr kumimoji="0" lang="vi-VN" sz="1100" b="0" i="0" u="none" strike="noStrike" kern="1200" cap="none" spc="0" normalizeH="0" baseline="0" noProof="0" dirty="0" smtClean="0">
-                <a:ln>
-                  <a:noFill/>
-                </a:ln>
-                <a:solidFill>
-                  <a:srgbClr val="231F20"/>
-                </a:solidFill>
-                <a:effectLst/>
-                <a:uLnTx/>
-                <a:uFillTx/>
-                <a:latin typeface="LG Smart_H Regular" panose="020B0600000101010101" pitchFamily="34" charset="-127"/>
-                <a:ea typeface="LG Smart_H Regular" panose="020B0600000101010101" pitchFamily="34" charset="-127"/>
-                <a:cs typeface="+mn-cs"/>
-              </a:rPr>
-              <a:t>No issue</a:t>
-            </a:r>
-            <a:endParaRPr kumimoji="0" lang="en-US" sz="1100" b="0" i="0" u="none" strike="noStrike" kern="1200" cap="none" spc="0" normalizeH="0" baseline="0" noProof="0" dirty="0" smtClean="0">
-              <a:ln>
-                <a:noFill/>
-              </a:ln>
-              <a:solidFill>
-                <a:srgbClr val="231F20"/>
-              </a:solidFill>
-              <a:effectLst/>
-              <a:uLnTx/>
-              <a:uFillTx/>
-              <a:latin typeface="LG Smart_H Regular" panose="020B0600000101010101" pitchFamily="34" charset="-127"/>
-              <a:ea typeface="LG Smart_H Regular" panose="020B0600000101010101" pitchFamily="34" charset="-127"/>
-              <a:cs typeface="+mn-cs"/>
-            </a:endParaRPr>
-          </a:p>
-        </p:txBody>
-      </p:sp>
       <p:grpSp>
         <p:nvGrpSpPr>
           <p:cNvPr id="6" name="Group 5"/>
@@ -5133,6 +4374,227 @@
           </p:spPr>
         </p:pic>
       </p:grpSp>
+      <p:sp>
+        <p:nvSpPr>
+          <p:cNvPr id="12" name="TextBox 11"/>
+          <p:cNvSpPr txBox="1"/>
+          <p:nvPr/>
+        </p:nvSpPr>
+        <p:spPr>
+          <a:xfrm>
+            <a:off x="62006" y="548680"/>
+            <a:ext cx="6192688" cy="769441"/>
+          </a:xfrm>
+          <a:prstGeom prst="rect">
+            <a:avLst/>
+          </a:prstGeom>
+          <a:noFill/>
+        </p:spPr>
+        <p:txBody>
+          <a:bodyPr wrap="square" rtlCol="0">
+            <a:spAutoFit/>
+          </a:bodyPr>
+          <a:lstStyle/>
+          <a:p>
+            <a:pPr marL="171450" marR="0" lvl="0" indent="-171450" algn="l" defTabSz="914400" rtl="0" eaLnBrk="1" fontAlgn="auto" latinLnBrk="1" hangingPunct="1">
+              <a:lnSpc>
+                <a:spcPct val="100000"/>
+              </a:lnSpc>
+              <a:spcBef>
+                <a:spcPts val="0"/>
+              </a:spcBef>
+              <a:spcAft>
+                <a:spcPts val="0"/>
+              </a:spcAft>
+              <a:buClrTx/>
+              <a:buSzTx/>
+              <a:buFont typeface="Arial" panose="020B0604020202020204" pitchFamily="34" charset="0"/>
+              <a:buChar char="•"/>
+              <a:tabLst/>
+              <a:defRPr/>
+            </a:pPr>
+            <a:r>
+              <a:rPr kumimoji="0" lang="en-US" sz="1100" b="0" i="0" u="none" strike="noStrike" kern="1200" cap="none" spc="0" normalizeH="0" baseline="0" noProof="0" dirty="0" smtClean="0">
+                <a:ln>
+                  <a:noFill/>
+                </a:ln>
+                <a:solidFill>
+                  <a:srgbClr val="231F20"/>
+                </a:solidFill>
+                <a:effectLst/>
+                <a:uLnTx/>
+                <a:uFillTx/>
+                <a:latin typeface="LG Smart_H Regular" panose="020B0600000101010101" pitchFamily="34" charset="-127"/>
+                <a:ea typeface="LG Smart_H Regular" panose="020B0600000101010101" pitchFamily="34" charset="-127"/>
+                <a:cs typeface="+mn-cs"/>
+              </a:rPr>
+              <a:t>Line</a:t>
+            </a:r>
+            <a:r>
+              <a:rPr kumimoji="0" lang="en-US" sz="1100" b="0" i="0" u="none" strike="noStrike" kern="1200" cap="none" spc="0" normalizeH="0" noProof="0" dirty="0" smtClean="0">
+                <a:ln>
+                  <a:noFill/>
+                </a:ln>
+                <a:solidFill>
+                  <a:srgbClr val="231F20"/>
+                </a:solidFill>
+                <a:effectLst/>
+                <a:uLnTx/>
+                <a:uFillTx/>
+                <a:latin typeface="LG Smart_H Regular" panose="020B0600000101010101" pitchFamily="34" charset="-127"/>
+                <a:ea typeface="LG Smart_H Regular" panose="020B0600000101010101" pitchFamily="34" charset="-127"/>
+                <a:cs typeface="+mn-cs"/>
+              </a:rPr>
+              <a:t> 1</a:t>
+            </a:r>
+          </a:p>
+          <a:p>
+            <a:pPr marL="171450" marR="0" lvl="0" indent="-171450" algn="l" defTabSz="914400" rtl="0" eaLnBrk="1" fontAlgn="auto" latinLnBrk="1" hangingPunct="1">
+              <a:lnSpc>
+                <a:spcPct val="100000"/>
+              </a:lnSpc>
+              <a:spcBef>
+                <a:spcPts val="0"/>
+              </a:spcBef>
+              <a:spcAft>
+                <a:spcPts val="0"/>
+              </a:spcAft>
+              <a:buClrTx/>
+              <a:buSzTx/>
+              <a:buFont typeface="Arial" panose="020B0604020202020204" pitchFamily="34" charset="0"/>
+              <a:buChar char="•"/>
+              <a:tabLst/>
+              <a:defRPr/>
+            </a:pPr>
+            <a:r>
+              <a:rPr lang="en-US" sz="1100" baseline="0" dirty="0" smtClean="0">
+                <a:solidFill>
+                  <a:srgbClr val="231F20"/>
+                </a:solidFill>
+                <a:latin typeface="LG Smart_H Regular" panose="020B0600000101010101" pitchFamily="34" charset="-127"/>
+                <a:ea typeface="LG Smart_H Regular" panose="020B0600000101010101" pitchFamily="34" charset="-127"/>
+              </a:rPr>
+              <a:t>Line</a:t>
+            </a:r>
+            <a:r>
+              <a:rPr lang="en-US" sz="1100" dirty="0" smtClean="0">
+                <a:solidFill>
+                  <a:srgbClr val="231F20"/>
+                </a:solidFill>
+                <a:latin typeface="LG Smart_H Regular" panose="020B0600000101010101" pitchFamily="34" charset="-127"/>
+                <a:ea typeface="LG Smart_H Regular" panose="020B0600000101010101" pitchFamily="34" charset="-127"/>
+              </a:rPr>
+              <a:t> 2</a:t>
+            </a:r>
+          </a:p>
+          <a:p>
+            <a:pPr marL="171450" marR="0" lvl="0" indent="-171450" algn="l" defTabSz="914400" rtl="0" eaLnBrk="1" fontAlgn="auto" latinLnBrk="1" hangingPunct="1">
+              <a:lnSpc>
+                <a:spcPct val="100000"/>
+              </a:lnSpc>
+              <a:spcBef>
+                <a:spcPts val="0"/>
+              </a:spcBef>
+              <a:spcAft>
+                <a:spcPts val="0"/>
+              </a:spcAft>
+              <a:buClrTx/>
+              <a:buSzTx/>
+              <a:buFont typeface="Arial" panose="020B0604020202020204" pitchFamily="34" charset="0"/>
+              <a:buChar char="•"/>
+              <a:tabLst/>
+              <a:defRPr/>
+            </a:pPr>
+            <a:r>
+              <a:rPr kumimoji="0" lang="en-US" sz="1100" b="0" i="0" u="none" strike="noStrike" kern="1200" cap="none" spc="0" normalizeH="0" baseline="0" noProof="0" dirty="0" smtClean="0">
+                <a:ln>
+                  <a:noFill/>
+                </a:ln>
+                <a:solidFill>
+                  <a:srgbClr val="231F20"/>
+                </a:solidFill>
+                <a:effectLst/>
+                <a:uLnTx/>
+                <a:uFillTx/>
+                <a:latin typeface="LG Smart_H Regular" panose="020B0600000101010101" pitchFamily="34" charset="-127"/>
+                <a:ea typeface="LG Smart_H Regular" panose="020B0600000101010101" pitchFamily="34" charset="-127"/>
+                <a:cs typeface="+mn-cs"/>
+              </a:rPr>
+              <a:t>Line</a:t>
+            </a:r>
+            <a:r>
+              <a:rPr kumimoji="0" lang="en-US" sz="1100" b="0" i="0" u="none" strike="noStrike" kern="1200" cap="none" spc="0" normalizeH="0" noProof="0" dirty="0" smtClean="0">
+                <a:ln>
+                  <a:noFill/>
+                </a:ln>
+                <a:solidFill>
+                  <a:srgbClr val="231F20"/>
+                </a:solidFill>
+                <a:effectLst/>
+                <a:uLnTx/>
+                <a:uFillTx/>
+                <a:latin typeface="LG Smart_H Regular" panose="020B0600000101010101" pitchFamily="34" charset="-127"/>
+                <a:ea typeface="LG Smart_H Regular" panose="020B0600000101010101" pitchFamily="34" charset="-127"/>
+                <a:cs typeface="+mn-cs"/>
+              </a:rPr>
+              <a:t> 3</a:t>
+            </a:r>
+          </a:p>
+          <a:p>
+            <a:pPr marL="171450" marR="0" lvl="0" indent="-171450" algn="l" defTabSz="914400" rtl="0" eaLnBrk="1" fontAlgn="auto" latinLnBrk="1" hangingPunct="1">
+              <a:lnSpc>
+                <a:spcPct val="100000"/>
+              </a:lnSpc>
+              <a:spcBef>
+                <a:spcPts val="0"/>
+              </a:spcBef>
+              <a:spcAft>
+                <a:spcPts val="0"/>
+              </a:spcAft>
+              <a:buClrTx/>
+              <a:buSzTx/>
+              <a:buFont typeface="Arial" panose="020B0604020202020204" pitchFamily="34" charset="0"/>
+              <a:buChar char="•"/>
+              <a:tabLst/>
+              <a:defRPr/>
+            </a:pPr>
+            <a:r>
+              <a:rPr lang="en-US" sz="1100" baseline="0" dirty="0" smtClean="0">
+                <a:solidFill>
+                  <a:srgbClr val="231F20"/>
+                </a:solidFill>
+                <a:latin typeface="LG Smart_H Regular" panose="020B0600000101010101" pitchFamily="34" charset="-127"/>
+                <a:ea typeface="LG Smart_H Regular" panose="020B0600000101010101" pitchFamily="34" charset="-127"/>
+              </a:rPr>
+              <a:t>Line</a:t>
+            </a:r>
+            <a:r>
+              <a:rPr lang="en-US" sz="1100" dirty="0" smtClean="0">
+                <a:solidFill>
+                  <a:srgbClr val="231F20"/>
+                </a:solidFill>
+                <a:latin typeface="LG Smart_H Regular" panose="020B0600000101010101" pitchFamily="34" charset="-127"/>
+                <a:ea typeface="LG Smart_H Regular" panose="020B0600000101010101" pitchFamily="34" charset="-127"/>
+              </a:rPr>
+              <a:t> 4</a:t>
+            </a:r>
+            <a:endParaRPr kumimoji="0" lang="en-US" sz="1100" b="0" i="0" u="none" strike="noStrike" kern="1200" cap="none" spc="0" normalizeH="0" baseline="0" noProof="0" dirty="0" smtClean="0">
+              <a:ln>
+                <a:noFill/>
+              </a:ln>
+              <a:solidFill>
+                <a:srgbClr val="231F20"/>
+              </a:solidFill>
+              <a:effectLst/>
+              <a:uLnTx/>
+              <a:uFillTx/>
+              <a:latin typeface="LG Smart_H Regular" panose="020B0600000101010101" pitchFamily="34" charset="-127"/>
+              <a:ea typeface="LG Smart_H Regular" panose="020B0600000101010101" pitchFamily="34" charset="-127"/>
+              <a:cs typeface="+mn-cs"/>
+            </a:endParaRPr>
+          </a:p>
+        </p:txBody>
+      </p:sp>
     </p:spTree>
     <p:extLst>
       <p:ext uri="{BB962C8B-B14F-4D97-AF65-F5344CB8AC3E}">
@@ -34082,8 +33544,8 @@
         </p:nvSpPr>
         <p:spPr>
           <a:xfrm>
-            <a:off x="62006" y="700512"/>
-            <a:ext cx="6192688" cy="261610"/>
+            <a:off x="62006" y="548680"/>
+            <a:ext cx="6192688" cy="769441"/>
           </a:xfrm>
           <a:prstGeom prst="rect">
             <a:avLst/>
@@ -34114,7 +33576,7 @@
               <a:defRPr/>
             </a:pPr>
             <a:r>
-              <a:rPr kumimoji="0" lang="vi-VN" sz="1100" b="0" i="0" u="none" strike="noStrike" kern="1200" cap="none" spc="0" normalizeH="0" baseline="0" noProof="0" dirty="0" smtClean="0">
+              <a:rPr kumimoji="0" lang="en-US" sz="1100" b="0" i="0" u="none" strike="noStrike" kern="1200" cap="none" spc="0" normalizeH="0" baseline="0" noProof="0" dirty="0" smtClean="0">
                 <a:ln>
                   <a:noFill/>
                 </a:ln>
@@ -34128,7 +33590,155 @@
                 <a:ea typeface="LG Smart_H Regular" panose="020B0600000101010101" pitchFamily="34" charset="-127"/>
                 <a:cs typeface="+mn-cs"/>
               </a:rPr>
-              <a:t>No issue</a:t>
+              <a:t>Line</a:t>
+            </a:r>
+            <a:r>
+              <a:rPr kumimoji="0" lang="en-US" sz="1100" b="0" i="0" u="none" strike="noStrike" kern="1200" cap="none" spc="0" normalizeH="0" noProof="0" dirty="0" smtClean="0">
+                <a:ln>
+                  <a:noFill/>
+                </a:ln>
+                <a:solidFill>
+                  <a:srgbClr val="231F20"/>
+                </a:solidFill>
+                <a:effectLst/>
+                <a:uLnTx/>
+                <a:uFillTx/>
+                <a:latin typeface="LG Smart_H Regular" panose="020B0600000101010101" pitchFamily="34" charset="-127"/>
+                <a:ea typeface="LG Smart_H Regular" panose="020B0600000101010101" pitchFamily="34" charset="-127"/>
+                <a:cs typeface="+mn-cs"/>
+              </a:rPr>
+              <a:t> 1</a:t>
+            </a:r>
+          </a:p>
+          <a:p>
+            <a:pPr marL="171450" marR="0" lvl="0" indent="-171450" algn="l" defTabSz="914400" rtl="0" eaLnBrk="1" fontAlgn="auto" latinLnBrk="1" hangingPunct="1">
+              <a:lnSpc>
+                <a:spcPct val="100000"/>
+              </a:lnSpc>
+              <a:spcBef>
+                <a:spcPts val="0"/>
+              </a:spcBef>
+              <a:spcAft>
+                <a:spcPts val="0"/>
+              </a:spcAft>
+              <a:buClrTx/>
+              <a:buSzTx/>
+              <a:buFont typeface="Arial" panose="020B0604020202020204" pitchFamily="34" charset="0"/>
+              <a:buChar char="•"/>
+              <a:tabLst/>
+              <a:defRPr/>
+            </a:pPr>
+            <a:r>
+              <a:rPr lang="en-US" sz="1100" baseline="0" dirty="0" smtClean="0">
+                <a:solidFill>
+                  <a:srgbClr val="231F20"/>
+                </a:solidFill>
+                <a:latin typeface="LG Smart_H Regular" panose="020B0600000101010101" pitchFamily="34" charset="-127"/>
+                <a:ea typeface="LG Smart_H Regular" panose="020B0600000101010101" pitchFamily="34" charset="-127"/>
+              </a:rPr>
+              <a:t>Line</a:t>
+            </a:r>
+            <a:r>
+              <a:rPr lang="en-US" sz="1100" dirty="0" smtClean="0">
+                <a:solidFill>
+                  <a:srgbClr val="231F20"/>
+                </a:solidFill>
+                <a:latin typeface="LG Smart_H Regular" panose="020B0600000101010101" pitchFamily="34" charset="-127"/>
+                <a:ea typeface="LG Smart_H Regular" panose="020B0600000101010101" pitchFamily="34" charset="-127"/>
+              </a:rPr>
+              <a:t> 2</a:t>
+            </a:r>
+          </a:p>
+          <a:p>
+            <a:pPr marL="171450" marR="0" lvl="0" indent="-171450" algn="l" defTabSz="914400" rtl="0" eaLnBrk="1" fontAlgn="auto" latinLnBrk="1" hangingPunct="1">
+              <a:lnSpc>
+                <a:spcPct val="100000"/>
+              </a:lnSpc>
+              <a:spcBef>
+                <a:spcPts val="0"/>
+              </a:spcBef>
+              <a:spcAft>
+                <a:spcPts val="0"/>
+              </a:spcAft>
+              <a:buClrTx/>
+              <a:buSzTx/>
+              <a:buFont typeface="Arial" panose="020B0604020202020204" pitchFamily="34" charset="0"/>
+              <a:buChar char="•"/>
+              <a:tabLst/>
+              <a:defRPr/>
+            </a:pPr>
+            <a:r>
+              <a:rPr kumimoji="0" lang="en-US" sz="1100" b="0" i="0" u="none" strike="noStrike" kern="1200" cap="none" spc="0" normalizeH="0" baseline="0" noProof="0" dirty="0" smtClean="0">
+                <a:ln>
+                  <a:noFill/>
+                </a:ln>
+                <a:solidFill>
+                  <a:srgbClr val="231F20"/>
+                </a:solidFill>
+                <a:effectLst/>
+                <a:uLnTx/>
+                <a:uFillTx/>
+                <a:latin typeface="LG Smart_H Regular" panose="020B0600000101010101" pitchFamily="34" charset="-127"/>
+                <a:ea typeface="LG Smart_H Regular" panose="020B0600000101010101" pitchFamily="34" charset="-127"/>
+                <a:cs typeface="+mn-cs"/>
+              </a:rPr>
+              <a:t>Line</a:t>
+            </a:r>
+            <a:r>
+              <a:rPr kumimoji="0" lang="en-US" sz="1100" b="0" i="0" u="none" strike="noStrike" kern="1200" cap="none" spc="0" normalizeH="0" noProof="0" dirty="0" smtClean="0">
+                <a:ln>
+                  <a:noFill/>
+                </a:ln>
+                <a:solidFill>
+                  <a:srgbClr val="231F20"/>
+                </a:solidFill>
+                <a:effectLst/>
+                <a:uLnTx/>
+                <a:uFillTx/>
+                <a:latin typeface="LG Smart_H Regular" panose="020B0600000101010101" pitchFamily="34" charset="-127"/>
+                <a:ea typeface="LG Smart_H Regular" panose="020B0600000101010101" pitchFamily="34" charset="-127"/>
+                <a:cs typeface="+mn-cs"/>
+              </a:rPr>
+              <a:t> 3</a:t>
+            </a:r>
+          </a:p>
+          <a:p>
+            <a:pPr marL="171450" marR="0" lvl="0" indent="-171450" algn="l" defTabSz="914400" rtl="0" eaLnBrk="1" fontAlgn="auto" latinLnBrk="1" hangingPunct="1">
+              <a:lnSpc>
+                <a:spcPct val="100000"/>
+              </a:lnSpc>
+              <a:spcBef>
+                <a:spcPts val="0"/>
+              </a:spcBef>
+              <a:spcAft>
+                <a:spcPts val="0"/>
+              </a:spcAft>
+              <a:buClrTx/>
+              <a:buSzTx/>
+              <a:buFont typeface="Arial" panose="020B0604020202020204" pitchFamily="34" charset="0"/>
+              <a:buChar char="•"/>
+              <a:tabLst/>
+              <a:defRPr/>
+            </a:pPr>
+            <a:r>
+              <a:rPr lang="en-US" sz="1100" baseline="0" dirty="0" smtClean="0">
+                <a:solidFill>
+                  <a:srgbClr val="231F20"/>
+                </a:solidFill>
+                <a:latin typeface="LG Smart_H Regular" panose="020B0600000101010101" pitchFamily="34" charset="-127"/>
+                <a:ea typeface="LG Smart_H Regular" panose="020B0600000101010101" pitchFamily="34" charset="-127"/>
+              </a:rPr>
+              <a:t>Line</a:t>
+            </a:r>
+            <a:r>
+              <a:rPr lang="en-US" sz="1100" dirty="0" smtClean="0">
+                <a:solidFill>
+                  <a:srgbClr val="231F20"/>
+                </a:solidFill>
+                <a:latin typeface="LG Smart_H Regular" panose="020B0600000101010101" pitchFamily="34" charset="-127"/>
+                <a:ea typeface="LG Smart_H Regular" panose="020B0600000101010101" pitchFamily="34" charset="-127"/>
+              </a:rPr>
+              <a:t> 4</a:t>
             </a:r>
             <a:endParaRPr kumimoji="0" lang="en-US" sz="1100" b="0" i="0" u="none" strike="noStrike" kern="1200" cap="none" spc="0" normalizeH="0" baseline="0" noProof="0" dirty="0" smtClean="0">
               <a:ln>
@@ -34517,692 +34127,6 @@
           </a:p>
         </p:txBody>
       </p:sp>
-      <p:graphicFrame>
-        <p:nvGraphicFramePr>
-          <p:cNvPr id="16" name="Table 15"/>
-          <p:cNvGraphicFramePr>
-            <a:graphicFrameLocks noGrp="1"/>
-          </p:cNvGraphicFramePr>
-          <p:nvPr>
-            <p:extLst/>
-          </p:nvPr>
-        </p:nvGraphicFramePr>
-        <p:xfrm>
-          <a:off x="6897217" y="692696"/>
-          <a:ext cx="2952328" cy="485775"/>
-        </p:xfrm>
-        <a:graphic>
-          <a:graphicData uri="http://schemas.openxmlformats.org/drawingml/2006/table">
-            <a:tbl>
-              <a:tblPr/>
-              <a:tblGrid>
-                <a:gridCol w="1022854">
-                  <a:extLst>
-                    <a:ext uri="{9D8B030D-6E8A-4147-A177-3AD203B41FA5}">
-                      <a16:colId xmlns:a16="http://schemas.microsoft.com/office/drawing/2014/main" val="4253317246"/>
-                    </a:ext>
-                  </a:extLst>
-                </a:gridCol>
-                <a:gridCol w="1615643">
-                  <a:extLst>
-                    <a:ext uri="{9D8B030D-6E8A-4147-A177-3AD203B41FA5}">
-                      <a16:colId xmlns:a16="http://schemas.microsoft.com/office/drawing/2014/main" val="1977838172"/>
-                    </a:ext>
-                  </a:extLst>
-                </a:gridCol>
-                <a:gridCol w="313831">
-                  <a:extLst>
-                    <a:ext uri="{9D8B030D-6E8A-4147-A177-3AD203B41FA5}">
-                      <a16:colId xmlns:a16="http://schemas.microsoft.com/office/drawing/2014/main" val="3225832083"/>
-                    </a:ext>
-                  </a:extLst>
-                </a:gridCol>
-              </a:tblGrid>
-              <a:tr h="161925">
-                <a:tc>
-                  <a:txBody>
-                    <a:bodyPr/>
-                    <a:lstStyle/>
-                    <a:p>
-                      <a:pPr algn="ctr" rtl="0" fontAlgn="ctr"/>
-                      <a:r>
-                        <a:rPr lang="en-US" sz="700" b="1" i="0" u="none" strike="noStrike">
-                          <a:solidFill>
-                            <a:srgbClr val="000000"/>
-                          </a:solidFill>
-                          <a:effectLst/>
-                          <a:latin typeface="LG Smart_H Regular" panose="020B0600000101010101" pitchFamily="34" charset="-127"/>
-                          <a:ea typeface="LG Smart_H Regular" panose="020B0600000101010101" pitchFamily="34" charset="-127"/>
-                        </a:rPr>
-                        <a:t>Object</a:t>
-                      </a:r>
-                    </a:p>
-                  </a:txBody>
-                  <a:tcPr marL="9525" marR="9525" marT="9525" marB="0" anchor="ctr">
-                    <a:lnL w="6350" cap="flat" cmpd="sng" algn="ctr">
-                      <a:solidFill>
-                        <a:srgbClr val="D9D9D9"/>
-                      </a:solidFill>
-                      <a:prstDash val="solid"/>
-                      <a:round/>
-                      <a:headEnd type="none" w="med" len="med"/>
-                      <a:tailEnd type="none" w="med" len="med"/>
-                    </a:lnL>
-                    <a:lnR w="6350" cap="flat" cmpd="sng" algn="ctr">
-                      <a:solidFill>
-                        <a:srgbClr val="D9D9D9"/>
-                      </a:solidFill>
-                      <a:prstDash val="solid"/>
-                      <a:round/>
-                      <a:headEnd type="none" w="med" len="med"/>
-                      <a:tailEnd type="none" w="med" len="med"/>
-                    </a:lnR>
-                    <a:lnT w="6350" cap="flat" cmpd="sng" algn="ctr">
-                      <a:solidFill>
-                        <a:srgbClr val="D9D9D9"/>
-                      </a:solidFill>
-                      <a:prstDash val="solid"/>
-                      <a:round/>
-                      <a:headEnd type="none" w="med" len="med"/>
-                      <a:tailEnd type="none" w="med" len="med"/>
-                    </a:lnT>
-                    <a:lnB w="6350" cap="flat" cmpd="sng" algn="ctr">
-                      <a:solidFill>
-                        <a:srgbClr val="D9D9D9"/>
-                      </a:solidFill>
-                      <a:prstDash val="solid"/>
-                      <a:round/>
-                      <a:headEnd type="none" w="med" len="med"/>
-                      <a:tailEnd type="none" w="med" len="med"/>
-                    </a:lnB>
-                    <a:solidFill>
-                      <a:srgbClr val="F2F2F2"/>
-                    </a:solidFill>
-                  </a:tcPr>
-                </a:tc>
-                <a:tc>
-                  <a:txBody>
-                    <a:bodyPr/>
-                    <a:lstStyle/>
-                    <a:p>
-                      <a:pPr algn="ctr" rtl="0" fontAlgn="ctr"/>
-                      <a:r>
-                        <a:rPr lang="vi-VN" sz="700" b="1" i="0" u="none" strike="noStrike" smtClean="0">
-                          <a:solidFill>
-                            <a:srgbClr val="000000"/>
-                          </a:solidFill>
-                          <a:effectLst/>
-                          <a:latin typeface="LG Smart_H Regular" panose="020B0600000101010101" pitchFamily="34" charset="-127"/>
-                          <a:ea typeface="LG Smart_H Regular" panose="020B0600000101010101" pitchFamily="34" charset="-127"/>
-                        </a:rPr>
-                        <a:t>PUC</a:t>
-                      </a:r>
-                      <a:r>
-                        <a:rPr lang="vi-VN" sz="700" b="1" i="0" u="none" strike="noStrike" baseline="0" smtClean="0">
-                          <a:solidFill>
-                            <a:srgbClr val="000000"/>
-                          </a:solidFill>
-                          <a:effectLst/>
-                          <a:latin typeface="LG Smart_H Regular" panose="020B0600000101010101" pitchFamily="34" charset="-127"/>
-                          <a:ea typeface="LG Smart_H Regular" panose="020B0600000101010101" pitchFamily="34" charset="-127"/>
-                        </a:rPr>
-                        <a:t> </a:t>
-                      </a:r>
-                      <a:r>
-                        <a:rPr lang="en-US" sz="700" b="1" i="0" u="none" strike="noStrike" baseline="0" smtClean="0">
-                          <a:solidFill>
-                            <a:srgbClr val="000000"/>
-                          </a:solidFill>
-                          <a:effectLst/>
-                          <a:latin typeface="LG Smart_H Regular" panose="020B0600000101010101" pitchFamily="34" charset="-127"/>
-                          <a:ea typeface="LG Smart_H Regular" panose="020B0600000101010101" pitchFamily="34" charset="-127"/>
-                        </a:rPr>
-                        <a:t>Machine</a:t>
-                      </a:r>
-                      <a:endParaRPr lang="en-US" sz="700" b="1" i="0" u="none" strike="noStrike" dirty="0">
-                        <a:solidFill>
-                          <a:srgbClr val="000000"/>
-                        </a:solidFill>
-                        <a:effectLst/>
-                        <a:latin typeface="LG Smart_H Regular" panose="020B0600000101010101" pitchFamily="34" charset="-127"/>
-                        <a:ea typeface="LG Smart_H Regular" panose="020B0600000101010101" pitchFamily="34" charset="-127"/>
-                      </a:endParaRPr>
-                    </a:p>
-                  </a:txBody>
-                  <a:tcPr marL="9525" marR="9525" marT="9525" marB="0" anchor="ctr">
-                    <a:lnL w="6350" cap="flat" cmpd="sng" algn="ctr">
-                      <a:solidFill>
-                        <a:srgbClr val="D9D9D9"/>
-                      </a:solidFill>
-                      <a:prstDash val="solid"/>
-                      <a:round/>
-                      <a:headEnd type="none" w="med" len="med"/>
-                      <a:tailEnd type="none" w="med" len="med"/>
-                    </a:lnL>
-                    <a:lnR w="6350" cap="flat" cmpd="sng" algn="ctr">
-                      <a:solidFill>
-                        <a:srgbClr val="D9D9D9"/>
-                      </a:solidFill>
-                      <a:prstDash val="solid"/>
-                      <a:round/>
-                      <a:headEnd type="none" w="med" len="med"/>
-                      <a:tailEnd type="none" w="med" len="med"/>
-                    </a:lnR>
-                    <a:lnT w="6350" cap="flat" cmpd="sng" algn="ctr">
-                      <a:solidFill>
-                        <a:srgbClr val="D9D9D9"/>
-                      </a:solidFill>
-                      <a:prstDash val="solid"/>
-                      <a:round/>
-                      <a:headEnd type="none" w="med" len="med"/>
-                      <a:tailEnd type="none" w="med" len="med"/>
-                    </a:lnT>
-                    <a:lnB w="6350" cap="flat" cmpd="sng" algn="ctr">
-                      <a:solidFill>
-                        <a:srgbClr val="D9D9D9"/>
-                      </a:solidFill>
-                      <a:prstDash val="solid"/>
-                      <a:round/>
-                      <a:headEnd type="none" w="med" len="med"/>
-                      <a:tailEnd type="none" w="med" len="med"/>
-                    </a:lnB>
-                    <a:solidFill>
-                      <a:srgbClr val="F2F2F2"/>
-                    </a:solidFill>
-                  </a:tcPr>
-                </a:tc>
-                <a:tc>
-                  <a:txBody>
-                    <a:bodyPr/>
-                    <a:lstStyle/>
-                    <a:p>
-                      <a:pPr algn="ctr" rtl="0" fontAlgn="ctr"/>
-                      <a:r>
-                        <a:rPr lang="en-US" sz="700" b="1" i="0" u="none" strike="noStrike">
-                          <a:solidFill>
-                            <a:srgbClr val="000000"/>
-                          </a:solidFill>
-                          <a:effectLst/>
-                          <a:latin typeface="LG Smart_H Regular" panose="020B0600000101010101" pitchFamily="34" charset="-127"/>
-                          <a:ea typeface="LG Smart_H Regular" panose="020B0600000101010101" pitchFamily="34" charset="-127"/>
-                        </a:rPr>
-                        <a:t>N</a:t>
-                      </a:r>
-                    </a:p>
-                  </a:txBody>
-                  <a:tcPr marL="9525" marR="9525" marT="9525" marB="0" anchor="ctr">
-                    <a:lnL w="6350" cap="flat" cmpd="sng" algn="ctr">
-                      <a:solidFill>
-                        <a:srgbClr val="D9D9D9"/>
-                      </a:solidFill>
-                      <a:prstDash val="solid"/>
-                      <a:round/>
-                      <a:headEnd type="none" w="med" len="med"/>
-                      <a:tailEnd type="none" w="med" len="med"/>
-                    </a:lnL>
-                    <a:lnR w="6350" cap="flat" cmpd="sng" algn="ctr">
-                      <a:solidFill>
-                        <a:srgbClr val="D9D9D9"/>
-                      </a:solidFill>
-                      <a:prstDash val="solid"/>
-                      <a:round/>
-                      <a:headEnd type="none" w="med" len="med"/>
-                      <a:tailEnd type="none" w="med" len="med"/>
-                    </a:lnR>
-                    <a:lnT w="6350" cap="flat" cmpd="sng" algn="ctr">
-                      <a:solidFill>
-                        <a:srgbClr val="D9D9D9"/>
-                      </a:solidFill>
-                      <a:prstDash val="solid"/>
-                      <a:round/>
-                      <a:headEnd type="none" w="med" len="med"/>
-                      <a:tailEnd type="none" w="med" len="med"/>
-                    </a:lnT>
-                    <a:lnB w="6350" cap="flat" cmpd="sng" algn="ctr">
-                      <a:solidFill>
-                        <a:srgbClr val="D9D9D9"/>
-                      </a:solidFill>
-                      <a:prstDash val="solid"/>
-                      <a:round/>
-                      <a:headEnd type="none" w="med" len="med"/>
-                      <a:tailEnd type="none" w="med" len="med"/>
-                    </a:lnB>
-                    <a:solidFill>
-                      <a:srgbClr val="F2F2F2"/>
-                    </a:solidFill>
-                  </a:tcPr>
-                </a:tc>
-                <a:extLst>
-                  <a:ext uri="{0D108BD9-81ED-4DB2-BD59-A6C34878D82A}">
-                    <a16:rowId xmlns:a16="http://schemas.microsoft.com/office/drawing/2014/main" val="2898628585"/>
-                  </a:ext>
-                </a:extLst>
-              </a:tr>
-              <a:tr h="161925">
-                <a:tc>
-                  <a:txBody>
-                    <a:bodyPr/>
-                    <a:lstStyle/>
-                    <a:p>
-                      <a:pPr algn="ctr" rtl="0" fontAlgn="b"/>
-                      <a:r>
-                        <a:rPr lang="vi-VN" sz="700" b="0" i="0" u="none" strike="noStrike" smtClean="0">
-                          <a:solidFill>
-                            <a:srgbClr val="000000"/>
-                          </a:solidFill>
-                          <a:effectLst/>
-                          <a:latin typeface="LG Smart_H Regular" panose="020B0600000101010101" pitchFamily="34" charset="-127"/>
-                          <a:ea typeface="LG Smart_H Regular" panose="020B0600000101010101" pitchFamily="34" charset="-127"/>
-                        </a:rPr>
-                        <a:t>Mono</a:t>
-                      </a:r>
-                      <a:endParaRPr lang="en-US" sz="700" b="0" i="0" u="none" strike="noStrike" dirty="0">
-                        <a:solidFill>
-                          <a:srgbClr val="000000"/>
-                        </a:solidFill>
-                        <a:effectLst/>
-                        <a:latin typeface="LG Smart_H Regular" panose="020B0600000101010101" pitchFamily="34" charset="-127"/>
-                        <a:ea typeface="LG Smart_H Regular" panose="020B0600000101010101" pitchFamily="34" charset="-127"/>
-                      </a:endParaRPr>
-                    </a:p>
-                  </a:txBody>
-                  <a:tcPr marL="9525" marR="9525" marT="9525" marB="0" anchor="b">
-                    <a:lnL w="6350" cap="flat" cmpd="sng" algn="ctr">
-                      <a:solidFill>
-                        <a:srgbClr val="D9D9D9"/>
-                      </a:solidFill>
-                      <a:prstDash val="solid"/>
-                      <a:round/>
-                      <a:headEnd type="none" w="med" len="med"/>
-                      <a:tailEnd type="none" w="med" len="med"/>
-                    </a:lnL>
-                    <a:lnR w="6350" cap="flat" cmpd="sng" algn="ctr">
-                      <a:solidFill>
-                        <a:srgbClr val="D9D9D9"/>
-                      </a:solidFill>
-                      <a:prstDash val="solid"/>
-                      <a:round/>
-                      <a:headEnd type="none" w="med" len="med"/>
-                      <a:tailEnd type="none" w="med" len="med"/>
-                    </a:lnR>
-                    <a:lnT w="6350" cap="flat" cmpd="sng" algn="ctr">
-                      <a:solidFill>
-                        <a:srgbClr val="D9D9D9"/>
-                      </a:solidFill>
-                      <a:prstDash val="solid"/>
-                      <a:round/>
-                      <a:headEnd type="none" w="med" len="med"/>
-                      <a:tailEnd type="none" w="med" len="med"/>
-                    </a:lnT>
-                    <a:lnB w="6350" cap="flat" cmpd="sng" algn="ctr">
-                      <a:solidFill>
-                        <a:srgbClr val="D9D9D9"/>
-                      </a:solidFill>
-                      <a:prstDash val="solid"/>
-                      <a:round/>
-                      <a:headEnd type="none" w="med" len="med"/>
-                      <a:tailEnd type="none" w="med" len="med"/>
-                    </a:lnB>
-                  </a:tcPr>
-                </a:tc>
-                <a:tc>
-                  <a:txBody>
-                    <a:bodyPr/>
-                    <a:lstStyle/>
-                    <a:p>
-                      <a:pPr algn="ctr" rtl="0" fontAlgn="b"/>
-                      <a:r>
-                        <a:rPr lang="vi-VN" sz="700" b="0" i="0" u="none" strike="noStrike" smtClean="0">
-                          <a:solidFill>
-                            <a:srgbClr val="000000"/>
-                          </a:solidFill>
-                          <a:effectLst/>
-                          <a:latin typeface="LG Smart_H Regular" panose="020B0600000101010101" pitchFamily="34" charset="-127"/>
-                          <a:ea typeface="LG Smart_H Regular" panose="020B0600000101010101" pitchFamily="34" charset="-127"/>
-                        </a:rPr>
-                        <a:t>300nits</a:t>
-                      </a:r>
-                      <a:r>
-                        <a:rPr lang="vi-VN" sz="700" b="0" i="0" u="none" strike="noStrike" baseline="0" smtClean="0">
-                          <a:solidFill>
-                            <a:srgbClr val="000000"/>
-                          </a:solidFill>
-                          <a:effectLst/>
-                          <a:latin typeface="LG Smart_H Regular" panose="020B0600000101010101" pitchFamily="34" charset="-127"/>
-                          <a:ea typeface="LG Smart_H Regular" panose="020B0600000101010101" pitchFamily="34" charset="-127"/>
-                        </a:rPr>
-                        <a:t> capture + DLL 4.0.5.15</a:t>
-                      </a:r>
-                      <a:endParaRPr lang="en-US" sz="700" b="0" i="0" u="none" strike="noStrike" dirty="0">
-                        <a:solidFill>
-                          <a:srgbClr val="000000"/>
-                        </a:solidFill>
-                        <a:effectLst/>
-                        <a:latin typeface="LG Smart_H Regular" panose="020B0600000101010101" pitchFamily="34" charset="-127"/>
-                        <a:ea typeface="LG Smart_H Regular" panose="020B0600000101010101" pitchFamily="34" charset="-127"/>
-                      </a:endParaRPr>
-                    </a:p>
-                  </a:txBody>
-                  <a:tcPr marL="9525" marR="9525" marT="9525" marB="0" anchor="b">
-                    <a:lnL w="6350" cap="flat" cmpd="sng" algn="ctr">
-                      <a:solidFill>
-                        <a:srgbClr val="D9D9D9"/>
-                      </a:solidFill>
-                      <a:prstDash val="solid"/>
-                      <a:round/>
-                      <a:headEnd type="none" w="med" len="med"/>
-                      <a:tailEnd type="none" w="med" len="med"/>
-                    </a:lnL>
-                    <a:lnR w="6350" cap="flat" cmpd="sng" algn="ctr">
-                      <a:solidFill>
-                        <a:srgbClr val="D9D9D9"/>
-                      </a:solidFill>
-                      <a:prstDash val="solid"/>
-                      <a:round/>
-                      <a:headEnd type="none" w="med" len="med"/>
-                      <a:tailEnd type="none" w="med" len="med"/>
-                    </a:lnR>
-                    <a:lnT w="6350" cap="flat" cmpd="sng" algn="ctr">
-                      <a:solidFill>
-                        <a:srgbClr val="D9D9D9"/>
-                      </a:solidFill>
-                      <a:prstDash val="solid"/>
-                      <a:round/>
-                      <a:headEnd type="none" w="med" len="med"/>
-                      <a:tailEnd type="none" w="med" len="med"/>
-                    </a:lnT>
-                    <a:lnB w="6350" cap="flat" cmpd="sng" algn="ctr">
-                      <a:solidFill>
-                        <a:srgbClr val="D9D9D9"/>
-                      </a:solidFill>
-                      <a:prstDash val="solid"/>
-                      <a:round/>
-                      <a:headEnd type="none" w="med" len="med"/>
-                      <a:tailEnd type="none" w="med" len="med"/>
-                    </a:lnB>
-                  </a:tcPr>
-                </a:tc>
-                <a:tc>
-                  <a:txBody>
-                    <a:bodyPr/>
-                    <a:lstStyle/>
-                    <a:p>
-                      <a:pPr algn="ctr" rtl="0" fontAlgn="b"/>
-                      <a:r>
-                        <a:rPr lang="en-US" sz="700" b="0" i="0" u="none" strike="noStrike" smtClean="0">
-                          <a:solidFill>
-                            <a:srgbClr val="000000"/>
-                          </a:solidFill>
-                          <a:effectLst/>
-                          <a:latin typeface="LG Smart_H Regular" panose="020B0600000101010101" pitchFamily="34" charset="-127"/>
-                          <a:ea typeface="LG Smart_H Regular" panose="020B0600000101010101" pitchFamily="34" charset="-127"/>
-                        </a:rPr>
-                        <a:t>236</a:t>
-                      </a:r>
-                      <a:endParaRPr lang="en-US" sz="700" b="0" i="0" u="none" strike="noStrike" dirty="0">
-                        <a:solidFill>
-                          <a:srgbClr val="000000"/>
-                        </a:solidFill>
-                        <a:effectLst/>
-                        <a:latin typeface="LG Smart_H Regular" panose="020B0600000101010101" pitchFamily="34" charset="-127"/>
-                        <a:ea typeface="LG Smart_H Regular" panose="020B0600000101010101" pitchFamily="34" charset="-127"/>
-                      </a:endParaRPr>
-                    </a:p>
-                  </a:txBody>
-                  <a:tcPr marL="9525" marR="9525" marT="9525" marB="0" anchor="b">
-                    <a:lnL w="6350" cap="flat" cmpd="sng" algn="ctr">
-                      <a:solidFill>
-                        <a:srgbClr val="D9D9D9"/>
-                      </a:solidFill>
-                      <a:prstDash val="solid"/>
-                      <a:round/>
-                      <a:headEnd type="none" w="med" len="med"/>
-                      <a:tailEnd type="none" w="med" len="med"/>
-                    </a:lnL>
-                    <a:lnR w="6350" cap="flat" cmpd="sng" algn="ctr">
-                      <a:solidFill>
-                        <a:srgbClr val="D9D9D9"/>
-                      </a:solidFill>
-                      <a:prstDash val="solid"/>
-                      <a:round/>
-                      <a:headEnd type="none" w="med" len="med"/>
-                      <a:tailEnd type="none" w="med" len="med"/>
-                    </a:lnR>
-                    <a:lnT w="6350" cap="flat" cmpd="sng" algn="ctr">
-                      <a:solidFill>
-                        <a:srgbClr val="D9D9D9"/>
-                      </a:solidFill>
-                      <a:prstDash val="solid"/>
-                      <a:round/>
-                      <a:headEnd type="none" w="med" len="med"/>
-                      <a:tailEnd type="none" w="med" len="med"/>
-                    </a:lnT>
-                    <a:lnB w="6350" cap="flat" cmpd="sng" algn="ctr">
-                      <a:solidFill>
-                        <a:srgbClr val="D9D9D9"/>
-                      </a:solidFill>
-                      <a:prstDash val="solid"/>
-                      <a:round/>
-                      <a:headEnd type="none" w="med" len="med"/>
-                      <a:tailEnd type="none" w="med" len="med"/>
-                    </a:lnB>
-                  </a:tcPr>
-                </a:tc>
-                <a:extLst>
-                  <a:ext uri="{0D108BD9-81ED-4DB2-BD59-A6C34878D82A}">
-                    <a16:rowId xmlns:a16="http://schemas.microsoft.com/office/drawing/2014/main" val="1204678615"/>
-                  </a:ext>
-                </a:extLst>
-              </a:tr>
-              <a:tr h="161925">
-                <a:tc>
-                  <a:txBody>
-                    <a:bodyPr/>
-                    <a:lstStyle/>
-                    <a:p>
-                      <a:pPr algn="ctr" rtl="0" fontAlgn="b"/>
-                      <a:r>
-                        <a:rPr lang="en-US" sz="700" b="0" i="0" u="none" strike="noStrike" smtClean="0">
-                          <a:solidFill>
-                            <a:srgbClr val="000000"/>
-                          </a:solidFill>
-                          <a:effectLst/>
-                          <a:latin typeface="LG Smart_H Regular" panose="020B0600000101010101" pitchFamily="34" charset="-127"/>
-                          <a:ea typeface="LG Smart_H Regular" panose="020B0600000101010101" pitchFamily="34" charset="-127"/>
-                        </a:rPr>
-                        <a:t>Color</a:t>
-                      </a:r>
-                      <a:endParaRPr lang="en-US" sz="700" b="0" i="0" u="none" strike="noStrike" dirty="0">
-                        <a:solidFill>
-                          <a:srgbClr val="000000"/>
-                        </a:solidFill>
-                        <a:effectLst/>
-                        <a:latin typeface="LG Smart_H Regular" panose="020B0600000101010101" pitchFamily="34" charset="-127"/>
-                        <a:ea typeface="LG Smart_H Regular" panose="020B0600000101010101" pitchFamily="34" charset="-127"/>
-                      </a:endParaRPr>
-                    </a:p>
-                  </a:txBody>
-                  <a:tcPr marL="9525" marR="9525" marT="9525" marB="0" anchor="b">
-                    <a:lnL w="6350" cap="flat" cmpd="sng" algn="ctr">
-                      <a:solidFill>
-                        <a:srgbClr val="D9D9D9"/>
-                      </a:solidFill>
-                      <a:prstDash val="solid"/>
-                      <a:round/>
-                      <a:headEnd type="none" w="med" len="med"/>
-                      <a:tailEnd type="none" w="med" len="med"/>
-                    </a:lnL>
-                    <a:lnR w="6350" cap="flat" cmpd="sng" algn="ctr">
-                      <a:solidFill>
-                        <a:srgbClr val="D9D9D9"/>
-                      </a:solidFill>
-                      <a:prstDash val="solid"/>
-                      <a:round/>
-                      <a:headEnd type="none" w="med" len="med"/>
-                      <a:tailEnd type="none" w="med" len="med"/>
-                    </a:lnR>
-                    <a:lnT w="6350" cap="flat" cmpd="sng" algn="ctr">
-                      <a:solidFill>
-                        <a:srgbClr val="D9D9D9"/>
-                      </a:solidFill>
-                      <a:prstDash val="solid"/>
-                      <a:round/>
-                      <a:headEnd type="none" w="med" len="med"/>
-                      <a:tailEnd type="none" w="med" len="med"/>
-                    </a:lnT>
-                    <a:lnB w="6350" cap="flat" cmpd="sng" algn="ctr">
-                      <a:solidFill>
-                        <a:srgbClr val="D9D9D9"/>
-                      </a:solidFill>
-                      <a:prstDash val="solid"/>
-                      <a:round/>
-                      <a:headEnd type="none" w="med" len="med"/>
-                      <a:tailEnd type="none" w="med" len="med"/>
-                    </a:lnB>
-                  </a:tcPr>
-                </a:tc>
-                <a:tc>
-                  <a:txBody>
-                    <a:bodyPr/>
-                    <a:lstStyle/>
-                    <a:p>
-                      <a:pPr algn="ctr" rtl="0" fontAlgn="b"/>
-                      <a:r>
-                        <a:rPr lang="vi-VN" sz="700" b="0" i="0" u="none" strike="noStrike" smtClean="0">
-                          <a:solidFill>
-                            <a:srgbClr val="000000"/>
-                          </a:solidFill>
-                          <a:effectLst/>
-                          <a:latin typeface="LG Smart_H Regular" panose="020B0600000101010101" pitchFamily="34" charset="-127"/>
-                          <a:ea typeface="LG Smart_H Regular" panose="020B0600000101010101" pitchFamily="34" charset="-127"/>
-                        </a:rPr>
-                        <a:t>Mono + Color Cam at RGB 31/43</a:t>
-                      </a:r>
-                      <a:endParaRPr lang="en-US" sz="700" b="0" i="0" u="none" strike="noStrike" dirty="0">
-                        <a:solidFill>
-                          <a:srgbClr val="000000"/>
-                        </a:solidFill>
-                        <a:effectLst/>
-                        <a:latin typeface="LG Smart_H Regular" panose="020B0600000101010101" pitchFamily="34" charset="-127"/>
-                        <a:ea typeface="LG Smart_H Regular" panose="020B0600000101010101" pitchFamily="34" charset="-127"/>
-                      </a:endParaRPr>
-                    </a:p>
-                  </a:txBody>
-                  <a:tcPr marL="9525" marR="9525" marT="9525" marB="0" anchor="b">
-                    <a:lnL w="6350" cap="flat" cmpd="sng" algn="ctr">
-                      <a:solidFill>
-                        <a:srgbClr val="D9D9D9"/>
-                      </a:solidFill>
-                      <a:prstDash val="solid"/>
-                      <a:round/>
-                      <a:headEnd type="none" w="med" len="med"/>
-                      <a:tailEnd type="none" w="med" len="med"/>
-                    </a:lnL>
-                    <a:lnR w="6350" cap="flat" cmpd="sng" algn="ctr">
-                      <a:solidFill>
-                        <a:srgbClr val="D9D9D9"/>
-                      </a:solidFill>
-                      <a:prstDash val="solid"/>
-                      <a:round/>
-                      <a:headEnd type="none" w="med" len="med"/>
-                      <a:tailEnd type="none" w="med" len="med"/>
-                    </a:lnR>
-                    <a:lnT w="6350" cap="flat" cmpd="sng" algn="ctr">
-                      <a:solidFill>
-                        <a:srgbClr val="D9D9D9"/>
-                      </a:solidFill>
-                      <a:prstDash val="solid"/>
-                      <a:round/>
-                      <a:headEnd type="none" w="med" len="med"/>
-                      <a:tailEnd type="none" w="med" len="med"/>
-                    </a:lnT>
-                    <a:lnB w="6350" cap="flat" cmpd="sng" algn="ctr">
-                      <a:solidFill>
-                        <a:srgbClr val="D9D9D9"/>
-                      </a:solidFill>
-                      <a:prstDash val="solid"/>
-                      <a:round/>
-                      <a:headEnd type="none" w="med" len="med"/>
-                      <a:tailEnd type="none" w="med" len="med"/>
-                    </a:lnB>
-                  </a:tcPr>
-                </a:tc>
-                <a:tc>
-                  <a:txBody>
-                    <a:bodyPr/>
-                    <a:lstStyle/>
-                    <a:p>
-                      <a:pPr algn="ctr" rtl="0" fontAlgn="b"/>
-                      <a:r>
-                        <a:rPr lang="en-US" sz="700" b="0" i="0" u="none" strike="noStrike" smtClean="0">
-                          <a:solidFill>
-                            <a:srgbClr val="000000"/>
-                          </a:solidFill>
-                          <a:effectLst/>
-                          <a:latin typeface="LG Smart_H Regular" panose="020B0600000101010101" pitchFamily="34" charset="-127"/>
-                          <a:ea typeface="LG Smart_H Regular" panose="020B0600000101010101" pitchFamily="34" charset="-127"/>
-                        </a:rPr>
-                        <a:t>236</a:t>
-                      </a:r>
-                      <a:endParaRPr lang="en-US" sz="700" b="0" i="0" u="none" strike="noStrike" dirty="0">
-                        <a:solidFill>
-                          <a:srgbClr val="000000"/>
-                        </a:solidFill>
-                        <a:effectLst/>
-                        <a:latin typeface="LG Smart_H Regular" panose="020B0600000101010101" pitchFamily="34" charset="-127"/>
-                        <a:ea typeface="LG Smart_H Regular" panose="020B0600000101010101" pitchFamily="34" charset="-127"/>
-                      </a:endParaRPr>
-                    </a:p>
-                  </a:txBody>
-                  <a:tcPr marL="9525" marR="9525" marT="9525" marB="0" anchor="b">
-                    <a:lnL w="6350" cap="flat" cmpd="sng" algn="ctr">
-                      <a:solidFill>
-                        <a:srgbClr val="D9D9D9"/>
-                      </a:solidFill>
-                      <a:prstDash val="solid"/>
-                      <a:round/>
-                      <a:headEnd type="none" w="med" len="med"/>
-                      <a:tailEnd type="none" w="med" len="med"/>
-                    </a:lnL>
-                    <a:lnR w="6350" cap="flat" cmpd="sng" algn="ctr">
-                      <a:solidFill>
-                        <a:srgbClr val="D9D9D9"/>
-                      </a:solidFill>
-                      <a:prstDash val="solid"/>
-                      <a:round/>
-                      <a:headEnd type="none" w="med" len="med"/>
-                      <a:tailEnd type="none" w="med" len="med"/>
-                    </a:lnR>
-                    <a:lnT w="6350" cap="flat" cmpd="sng" algn="ctr">
-                      <a:solidFill>
-                        <a:srgbClr val="D9D9D9"/>
-                      </a:solidFill>
-                      <a:prstDash val="solid"/>
-                      <a:round/>
-                      <a:headEnd type="none" w="med" len="med"/>
-                      <a:tailEnd type="none" w="med" len="med"/>
-                    </a:lnT>
-                    <a:lnB w="6350" cap="flat" cmpd="sng" algn="ctr">
-                      <a:solidFill>
-                        <a:srgbClr val="D9D9D9"/>
-                      </a:solidFill>
-                      <a:prstDash val="solid"/>
-                      <a:round/>
-                      <a:headEnd type="none" w="med" len="med"/>
-                      <a:tailEnd type="none" w="med" len="med"/>
-                    </a:lnB>
-                  </a:tcPr>
-                </a:tc>
-                <a:extLst>
-                  <a:ext uri="{0D108BD9-81ED-4DB2-BD59-A6C34878D82A}">
-                    <a16:rowId xmlns:a16="http://schemas.microsoft.com/office/drawing/2014/main" val="3642427511"/>
-                  </a:ext>
-                </a:extLst>
-              </a:tr>
-            </a:tbl>
-          </a:graphicData>
-        </a:graphic>
-      </p:graphicFrame>
       <p:grpSp>
         <p:nvGrpSpPr>
           <p:cNvPr id="6" name="Group 5"/>
@@ -35429,79 +34353,6 @@
       </p:sp>
       <p:sp>
         <p:nvSpPr>
-          <p:cNvPr id="12" name="TextBox 11"/>
-          <p:cNvSpPr txBox="1"/>
-          <p:nvPr/>
-        </p:nvSpPr>
-        <p:spPr>
-          <a:xfrm>
-            <a:off x="62006" y="700512"/>
-            <a:ext cx="6192688" cy="261610"/>
-          </a:xfrm>
-          <a:prstGeom prst="rect">
-            <a:avLst/>
-          </a:prstGeom>
-          <a:noFill/>
-        </p:spPr>
-        <p:txBody>
-          <a:bodyPr wrap="square" rtlCol="0">
-            <a:spAutoFit/>
-          </a:bodyPr>
-          <a:lstStyle/>
-          <a:p>
-            <a:pPr marL="171450" marR="0" lvl="0" indent="-171450" algn="l" defTabSz="914400" rtl="0" eaLnBrk="1" fontAlgn="auto" latinLnBrk="1" hangingPunct="1">
-              <a:lnSpc>
-                <a:spcPct val="100000"/>
-              </a:lnSpc>
-              <a:spcBef>
-                <a:spcPts val="0"/>
-              </a:spcBef>
-              <a:spcAft>
-                <a:spcPts val="0"/>
-              </a:spcAft>
-              <a:buClrTx/>
-              <a:buSzTx/>
-              <a:buFont typeface="Arial" panose="020B0604020202020204" pitchFamily="34" charset="0"/>
-              <a:buChar char="•"/>
-              <a:tabLst/>
-              <a:defRPr/>
-            </a:pPr>
-            <a:r>
-              <a:rPr kumimoji="0" lang="vi-VN" sz="1100" b="0" i="0" u="none" strike="noStrike" kern="1200" cap="none" spc="0" normalizeH="0" baseline="0" noProof="0" dirty="0" smtClean="0">
-                <a:ln>
-                  <a:noFill/>
-                </a:ln>
-                <a:solidFill>
-                  <a:srgbClr val="231F20"/>
-                </a:solidFill>
-                <a:effectLst/>
-                <a:uLnTx/>
-                <a:uFillTx/>
-                <a:latin typeface="LG Smart_H Regular" panose="020B0600000101010101" pitchFamily="34" charset="-127"/>
-                <a:ea typeface="LG Smart_H Regular" panose="020B0600000101010101" pitchFamily="34" charset="-127"/>
-                <a:cs typeface="+mn-cs"/>
-              </a:rPr>
-              <a:t>No issue</a:t>
-            </a:r>
-            <a:endParaRPr kumimoji="0" lang="en-US" sz="1100" b="0" i="0" u="none" strike="noStrike" kern="1200" cap="none" spc="0" normalizeH="0" baseline="0" noProof="0" dirty="0" smtClean="0">
-              <a:ln>
-                <a:noFill/>
-              </a:ln>
-              <a:solidFill>
-                <a:srgbClr val="231F20"/>
-              </a:solidFill>
-              <a:effectLst/>
-              <a:uLnTx/>
-              <a:uFillTx/>
-              <a:latin typeface="LG Smart_H Regular" panose="020B0600000101010101" pitchFamily="34" charset="-127"/>
-              <a:ea typeface="LG Smart_H Regular" panose="020B0600000101010101" pitchFamily="34" charset="-127"/>
-              <a:cs typeface="+mn-cs"/>
-            </a:endParaRPr>
-          </a:p>
-        </p:txBody>
-      </p:sp>
-      <p:sp>
-        <p:nvSpPr>
           <p:cNvPr id="13" name="Title 1"/>
           <p:cNvSpPr txBox="1">
             <a:spLocks/>
@@ -36564,7 +35415,7 @@
         </p:nvGrpSpPr>
         <p:grpSpPr>
           <a:xfrm>
-            <a:off x="1126147" y="1377378"/>
+            <a:off x="1126147" y="1484784"/>
             <a:ext cx="7632848" cy="5088565"/>
             <a:chOff x="1270000" y="635001"/>
             <a:chExt cx="4572000" cy="3048000"/>
@@ -36667,6 +35518,227 @@
           </p:spPr>
         </p:pic>
       </p:grpSp>
+      <p:sp>
+        <p:nvSpPr>
+          <p:cNvPr id="11" name="TextBox 10"/>
+          <p:cNvSpPr txBox="1"/>
+          <p:nvPr/>
+        </p:nvSpPr>
+        <p:spPr>
+          <a:xfrm>
+            <a:off x="62006" y="548680"/>
+            <a:ext cx="6192688" cy="769441"/>
+          </a:xfrm>
+          <a:prstGeom prst="rect">
+            <a:avLst/>
+          </a:prstGeom>
+          <a:noFill/>
+        </p:spPr>
+        <p:txBody>
+          <a:bodyPr wrap="square" rtlCol="0">
+            <a:spAutoFit/>
+          </a:bodyPr>
+          <a:lstStyle/>
+          <a:p>
+            <a:pPr marL="171450" marR="0" lvl="0" indent="-171450" algn="l" defTabSz="914400" rtl="0" eaLnBrk="1" fontAlgn="auto" latinLnBrk="1" hangingPunct="1">
+              <a:lnSpc>
+                <a:spcPct val="100000"/>
+              </a:lnSpc>
+              <a:spcBef>
+                <a:spcPts val="0"/>
+              </a:spcBef>
+              <a:spcAft>
+                <a:spcPts val="0"/>
+              </a:spcAft>
+              <a:buClrTx/>
+              <a:buSzTx/>
+              <a:buFont typeface="Arial" panose="020B0604020202020204" pitchFamily="34" charset="0"/>
+              <a:buChar char="•"/>
+              <a:tabLst/>
+              <a:defRPr/>
+            </a:pPr>
+            <a:r>
+              <a:rPr kumimoji="0" lang="en-US" sz="1100" b="0" i="0" u="none" strike="noStrike" kern="1200" cap="none" spc="0" normalizeH="0" baseline="0" noProof="0" dirty="0" smtClean="0">
+                <a:ln>
+                  <a:noFill/>
+                </a:ln>
+                <a:solidFill>
+                  <a:srgbClr val="231F20"/>
+                </a:solidFill>
+                <a:effectLst/>
+                <a:uLnTx/>
+                <a:uFillTx/>
+                <a:latin typeface="LG Smart_H Regular" panose="020B0600000101010101" pitchFamily="34" charset="-127"/>
+                <a:ea typeface="LG Smart_H Regular" panose="020B0600000101010101" pitchFamily="34" charset="-127"/>
+                <a:cs typeface="+mn-cs"/>
+              </a:rPr>
+              <a:t>Line</a:t>
+            </a:r>
+            <a:r>
+              <a:rPr kumimoji="0" lang="en-US" sz="1100" b="0" i="0" u="none" strike="noStrike" kern="1200" cap="none" spc="0" normalizeH="0" noProof="0" dirty="0" smtClean="0">
+                <a:ln>
+                  <a:noFill/>
+                </a:ln>
+                <a:solidFill>
+                  <a:srgbClr val="231F20"/>
+                </a:solidFill>
+                <a:effectLst/>
+                <a:uLnTx/>
+                <a:uFillTx/>
+                <a:latin typeface="LG Smart_H Regular" panose="020B0600000101010101" pitchFamily="34" charset="-127"/>
+                <a:ea typeface="LG Smart_H Regular" panose="020B0600000101010101" pitchFamily="34" charset="-127"/>
+                <a:cs typeface="+mn-cs"/>
+              </a:rPr>
+              <a:t> 1</a:t>
+            </a:r>
+          </a:p>
+          <a:p>
+            <a:pPr marL="171450" marR="0" lvl="0" indent="-171450" algn="l" defTabSz="914400" rtl="0" eaLnBrk="1" fontAlgn="auto" latinLnBrk="1" hangingPunct="1">
+              <a:lnSpc>
+                <a:spcPct val="100000"/>
+              </a:lnSpc>
+              <a:spcBef>
+                <a:spcPts val="0"/>
+              </a:spcBef>
+              <a:spcAft>
+                <a:spcPts val="0"/>
+              </a:spcAft>
+              <a:buClrTx/>
+              <a:buSzTx/>
+              <a:buFont typeface="Arial" panose="020B0604020202020204" pitchFamily="34" charset="0"/>
+              <a:buChar char="•"/>
+              <a:tabLst/>
+              <a:defRPr/>
+            </a:pPr>
+            <a:r>
+              <a:rPr lang="en-US" sz="1100" baseline="0" dirty="0" smtClean="0">
+                <a:solidFill>
+                  <a:srgbClr val="231F20"/>
+                </a:solidFill>
+                <a:latin typeface="LG Smart_H Regular" panose="020B0600000101010101" pitchFamily="34" charset="-127"/>
+                <a:ea typeface="LG Smart_H Regular" panose="020B0600000101010101" pitchFamily="34" charset="-127"/>
+              </a:rPr>
+              <a:t>Line</a:t>
+            </a:r>
+            <a:r>
+              <a:rPr lang="en-US" sz="1100" dirty="0" smtClean="0">
+                <a:solidFill>
+                  <a:srgbClr val="231F20"/>
+                </a:solidFill>
+                <a:latin typeface="LG Smart_H Regular" panose="020B0600000101010101" pitchFamily="34" charset="-127"/>
+                <a:ea typeface="LG Smart_H Regular" panose="020B0600000101010101" pitchFamily="34" charset="-127"/>
+              </a:rPr>
+              <a:t> 2</a:t>
+            </a:r>
+          </a:p>
+          <a:p>
+            <a:pPr marL="171450" marR="0" lvl="0" indent="-171450" algn="l" defTabSz="914400" rtl="0" eaLnBrk="1" fontAlgn="auto" latinLnBrk="1" hangingPunct="1">
+              <a:lnSpc>
+                <a:spcPct val="100000"/>
+              </a:lnSpc>
+              <a:spcBef>
+                <a:spcPts val="0"/>
+              </a:spcBef>
+              <a:spcAft>
+                <a:spcPts val="0"/>
+              </a:spcAft>
+              <a:buClrTx/>
+              <a:buSzTx/>
+              <a:buFont typeface="Arial" panose="020B0604020202020204" pitchFamily="34" charset="0"/>
+              <a:buChar char="•"/>
+              <a:tabLst/>
+              <a:defRPr/>
+            </a:pPr>
+            <a:r>
+              <a:rPr kumimoji="0" lang="en-US" sz="1100" b="0" i="0" u="none" strike="noStrike" kern="1200" cap="none" spc="0" normalizeH="0" baseline="0" noProof="0" dirty="0" smtClean="0">
+                <a:ln>
+                  <a:noFill/>
+                </a:ln>
+                <a:solidFill>
+                  <a:srgbClr val="231F20"/>
+                </a:solidFill>
+                <a:effectLst/>
+                <a:uLnTx/>
+                <a:uFillTx/>
+                <a:latin typeface="LG Smart_H Regular" panose="020B0600000101010101" pitchFamily="34" charset="-127"/>
+                <a:ea typeface="LG Smart_H Regular" panose="020B0600000101010101" pitchFamily="34" charset="-127"/>
+                <a:cs typeface="+mn-cs"/>
+              </a:rPr>
+              <a:t>Line</a:t>
+            </a:r>
+            <a:r>
+              <a:rPr kumimoji="0" lang="en-US" sz="1100" b="0" i="0" u="none" strike="noStrike" kern="1200" cap="none" spc="0" normalizeH="0" noProof="0" dirty="0" smtClean="0">
+                <a:ln>
+                  <a:noFill/>
+                </a:ln>
+                <a:solidFill>
+                  <a:srgbClr val="231F20"/>
+                </a:solidFill>
+                <a:effectLst/>
+                <a:uLnTx/>
+                <a:uFillTx/>
+                <a:latin typeface="LG Smart_H Regular" panose="020B0600000101010101" pitchFamily="34" charset="-127"/>
+                <a:ea typeface="LG Smart_H Regular" panose="020B0600000101010101" pitchFamily="34" charset="-127"/>
+                <a:cs typeface="+mn-cs"/>
+              </a:rPr>
+              <a:t> 3</a:t>
+            </a:r>
+          </a:p>
+          <a:p>
+            <a:pPr marL="171450" marR="0" lvl="0" indent="-171450" algn="l" defTabSz="914400" rtl="0" eaLnBrk="1" fontAlgn="auto" latinLnBrk="1" hangingPunct="1">
+              <a:lnSpc>
+                <a:spcPct val="100000"/>
+              </a:lnSpc>
+              <a:spcBef>
+                <a:spcPts val="0"/>
+              </a:spcBef>
+              <a:spcAft>
+                <a:spcPts val="0"/>
+              </a:spcAft>
+              <a:buClrTx/>
+              <a:buSzTx/>
+              <a:buFont typeface="Arial" panose="020B0604020202020204" pitchFamily="34" charset="0"/>
+              <a:buChar char="•"/>
+              <a:tabLst/>
+              <a:defRPr/>
+            </a:pPr>
+            <a:r>
+              <a:rPr lang="en-US" sz="1100" baseline="0" dirty="0" smtClean="0">
+                <a:solidFill>
+                  <a:srgbClr val="231F20"/>
+                </a:solidFill>
+                <a:latin typeface="LG Smart_H Regular" panose="020B0600000101010101" pitchFamily="34" charset="-127"/>
+                <a:ea typeface="LG Smart_H Regular" panose="020B0600000101010101" pitchFamily="34" charset="-127"/>
+              </a:rPr>
+              <a:t>Line</a:t>
+            </a:r>
+            <a:r>
+              <a:rPr lang="en-US" sz="1100" dirty="0" smtClean="0">
+                <a:solidFill>
+                  <a:srgbClr val="231F20"/>
+                </a:solidFill>
+                <a:latin typeface="LG Smart_H Regular" panose="020B0600000101010101" pitchFamily="34" charset="-127"/>
+                <a:ea typeface="LG Smart_H Regular" panose="020B0600000101010101" pitchFamily="34" charset="-127"/>
+              </a:rPr>
+              <a:t> 4</a:t>
+            </a:r>
+            <a:endParaRPr kumimoji="0" lang="en-US" sz="1100" b="0" i="0" u="none" strike="noStrike" kern="1200" cap="none" spc="0" normalizeH="0" baseline="0" noProof="0" dirty="0" smtClean="0">
+              <a:ln>
+                <a:noFill/>
+              </a:ln>
+              <a:solidFill>
+                <a:srgbClr val="231F20"/>
+              </a:solidFill>
+              <a:effectLst/>
+              <a:uLnTx/>
+              <a:uFillTx/>
+              <a:latin typeface="LG Smart_H Regular" panose="020B0600000101010101" pitchFamily="34" charset="-127"/>
+              <a:ea typeface="LG Smart_H Regular" panose="020B0600000101010101" pitchFamily="34" charset="-127"/>
+              <a:cs typeface="+mn-cs"/>
+            </a:endParaRPr>
+          </a:p>
+        </p:txBody>
+      </p:sp>
     </p:spTree>
     <p:extLst>
       <p:ext uri="{BB962C8B-B14F-4D97-AF65-F5344CB8AC3E}">

</xml_diff>

<commit_message>
Implement successfully 1 e be 35t vao nghe code
</commit_message>
<xml_diff>
--- a/Template_Report.pptx
+++ b/Template_Report.pptx
@@ -249,7 +249,7 @@
           <a:p>
             <a:fld id="{0636C835-E120-4134-B60F-ABD596A38320}" type="datetimeFigureOut">
               <a:rPr lang="ko-KR" altLang="en-US" smtClean="0"/>
-              <a:t>2024-03-05</a:t>
+              <a:t>2024-03-14</a:t>
             </a:fld>
             <a:endParaRPr lang="ko-KR" altLang="en-US"/>
           </a:p>
@@ -414,7 +414,7 @@
           <a:p>
             <a:fld id="{FA8743F4-7298-4609-A154-E3A1492A11EA}" type="datetimeFigureOut">
               <a:rPr lang="ko-KR" altLang="en-US" smtClean="0"/>
-              <a:t>2024-03-05</a:t>
+              <a:t>2024-03-14</a:t>
             </a:fld>
             <a:endParaRPr lang="ko-KR" altLang="en-US"/>
           </a:p>
@@ -1043,7 +1043,7 @@
           </a:prstGeom>
           <a:extLst>
             <a:ext uri="{C572A759-6A51-4108-AA02-DFA0A04FC94B}">
-              <ma14:wrappingTextBoxFlag xmlns="" xmlns:m="http://schemas.openxmlformats.org/officeDocument/2006/math" xmlns:a14="http://schemas.microsoft.com/office/drawing/2010/main" xmlns:ma14="http://schemas.microsoft.com/office/mac/drawingml/2011/main" val="1"/>
+              <ma14:wrappingTextBoxFlag xmlns:ma14="http://schemas.microsoft.com/office/mac/drawingml/2011/main" xmlns:a14="http://schemas.microsoft.com/office/drawing/2010/main" xmlns:m="http://schemas.openxmlformats.org/officeDocument/2006/math" xmlns="" val="1"/>
             </a:ext>
           </a:extLst>
         </p:spPr>
@@ -1106,7 +1106,7 @@
           </a:ln>
           <a:extLst>
             <a:ext uri="{C572A759-6A51-4108-AA02-DFA0A04FC94B}">
-              <ma14:wrappingTextBoxFlag xmlns="" xmlns:m="http://schemas.openxmlformats.org/officeDocument/2006/math" xmlns:a14="http://schemas.microsoft.com/office/drawing/2010/main" xmlns:ma14="http://schemas.microsoft.com/office/mac/drawingml/2011/main" val="1"/>
+              <ma14:wrappingTextBoxFlag xmlns:ma14="http://schemas.microsoft.com/office/mac/drawingml/2011/main" xmlns:a14="http://schemas.microsoft.com/office/drawing/2010/main" xmlns:m="http://schemas.openxmlformats.org/officeDocument/2006/math" xmlns="" val="1"/>
             </a:ext>
           </a:extLst>
         </p:spPr>
@@ -1467,7 +1467,7 @@
           </a:ln>
           <a:extLst>
             <a:ext uri="{C572A759-6A51-4108-AA02-DFA0A04FC94B}">
-              <ma14:wrappingTextBoxFlag xmlns="" xmlns:m="http://schemas.openxmlformats.org/officeDocument/2006/math" xmlns:a14="http://schemas.microsoft.com/office/drawing/2010/main" xmlns:ma14="http://schemas.microsoft.com/office/mac/drawingml/2011/main" val="1"/>
+              <ma14:wrappingTextBoxFlag xmlns:ma14="http://schemas.microsoft.com/office/mac/drawingml/2011/main" xmlns:a14="http://schemas.microsoft.com/office/drawing/2010/main" xmlns:m="http://schemas.openxmlformats.org/officeDocument/2006/math" xmlns="" val="1"/>
             </a:ext>
           </a:extLst>
         </p:spPr>
@@ -2271,69 +2271,6 @@
           </a:p>
         </p:txBody>
       </p:sp>
-      <p:grpSp>
-        <p:nvGrpSpPr>
-          <p:cNvPr id="6" name="Group 5"/>
-          <p:cNvGrpSpPr/>
-          <p:nvPr/>
-        </p:nvGrpSpPr>
-        <p:grpSpPr>
-          <a:xfrm>
-            <a:off x="128464" y="2060848"/>
-            <a:ext cx="9652811" cy="3217604"/>
-            <a:chOff x="1270000" y="635001"/>
-            <a:chExt cx="4572000" cy="1524000"/>
-          </a:xfrm>
-        </p:grpSpPr>
-        <p:pic>
-          <p:nvPicPr>
-            <p:cNvPr id="8" name="Picture 7"/>
-            <p:cNvPicPr>
-              <a:picLocks noChangeAspect="1"/>
-            </p:cNvPicPr>
-            <p:nvPr/>
-          </p:nvPicPr>
-          <p:blipFill>
-            <a:blip r:embed="rId3"/>
-            <a:stretch>
-              <a:fillRect/>
-            </a:stretch>
-          </p:blipFill>
-          <p:spPr>
-            <a:xfrm>
-              <a:off x="1270000" y="635001"/>
-              <a:ext cx="2286000" cy="1524000"/>
-            </a:xfrm>
-            <a:prstGeom prst="rect">
-              <a:avLst/>
-            </a:prstGeom>
-          </p:spPr>
-        </p:pic>
-        <p:pic>
-          <p:nvPicPr>
-            <p:cNvPr id="10" name="Picture 9"/>
-            <p:cNvPicPr>
-              <a:picLocks noChangeAspect="1"/>
-            </p:cNvPicPr>
-            <p:nvPr/>
-          </p:nvPicPr>
-          <p:blipFill>
-            <a:blip r:embed="rId4"/>
-            <a:stretch>
-              <a:fillRect/>
-            </a:stretch>
-          </p:blipFill>
-          <p:spPr>
-            <a:xfrm>
-              <a:off x="3556000" y="635001"/>
-              <a:ext cx="2286000" cy="1524000"/>
-            </a:xfrm>
-            <a:prstGeom prst="rect">
-              <a:avLst/>
-            </a:prstGeom>
-          </p:spPr>
-        </p:pic>
-      </p:grpSp>
       <p:sp>
         <p:nvSpPr>
           <p:cNvPr id="12" name="TextBox 11"/>

</xml_diff>